<commit_message>
Minor fixes and edits
</commit_message>
<xml_diff>
--- a/tutorial-02-hello_world.pptx
+++ b/tutorial-02-hello_world.pptx
@@ -206,7 +206,7 @@
           <a:p>
             <a:fld id="{775CE290-E0F5-444C-B849-A8F17CD4104C}" type="datetimeFigureOut">
               <a:rPr lang="en-US" smtClean="0"/>
-              <a:t>9/8/14</a:t>
+              <a:t>9/9/14</a:t>
             </a:fld>
             <a:endParaRPr lang="en-US"/>
           </a:p>
@@ -372,7 +372,7 @@
           <a:p>
             <a:fld id="{AD53A24C-4135-094C-957B-35852E7EDFA4}" type="datetimeFigureOut">
               <a:rPr lang="en-US" smtClean="0"/>
-              <a:t>9/8/14</a:t>
+              <a:t>9/9/14</a:t>
             </a:fld>
             <a:endParaRPr lang="en-US"/>
           </a:p>
@@ -833,7 +833,7 @@
           <a:p>
             <a:fld id="{B594EA25-E4F4-3746-A0BA-A11E27330E0F}" type="datetime2">
               <a:rPr lang="en-US" smtClean="0"/>
-              <a:t>Monday, September 8, 14</a:t>
+              <a:t>Tuesday, September 9, 14</a:t>
             </a:fld>
             <a:endParaRPr lang="en-US"/>
           </a:p>
@@ -1136,7 +1136,7 @@
                 <a:latin typeface="Times New Roman"/>
                 <a:cs typeface="Times New Roman"/>
               </a:rPr>
-              <a:t>September 8, 2014</a:t>
+              <a:t>September 9, 2014</a:t>
             </a:fld>
             <a:endParaRPr lang="en-US" dirty="0">
               <a:latin typeface="Times New Roman"/>
@@ -1423,7 +1423,7 @@
           <a:p>
             <a:fld id="{EA699BF9-66CB-F244-8E74-7B1BE1C77046}" type="datetime2">
               <a:rPr lang="en-US" smtClean="0"/>
-              <a:t>Monday, September 8, 14</a:t>
+              <a:t>Tuesday, September 9, 14</a:t>
             </a:fld>
             <a:endParaRPr lang="en-US"/>
           </a:p>
@@ -1734,7 +1734,7 @@
           <a:p>
             <a:fld id="{D300BE84-9843-8B4F-B3C8-647B06AC46C9}" type="datetime2">
               <a:rPr lang="en-US" smtClean="0"/>
-              <a:t>Monday, September 8, 14</a:t>
+              <a:t>Tuesday, September 9, 14</a:t>
             </a:fld>
             <a:endParaRPr lang="en-US"/>
           </a:p>
@@ -1905,7 +1905,7 @@
           <a:p>
             <a:fld id="{C460AE39-2092-A945-8296-F25085B9A0F1}" type="datetime2">
               <a:rPr lang="en-US" smtClean="0"/>
-              <a:t>Monday, September 8, 14</a:t>
+              <a:t>Tuesday, September 9, 14</a:t>
             </a:fld>
             <a:endParaRPr lang="en-US"/>
           </a:p>
@@ -2086,7 +2086,7 @@
           <a:p>
             <a:fld id="{63BC7E9D-3218-5E49-A867-E087AB2F4618}" type="datetime2">
               <a:rPr lang="en-US" smtClean="0"/>
-              <a:t>Monday, September 8, 14</a:t>
+              <a:t>Tuesday, September 9, 14</a:t>
             </a:fld>
             <a:endParaRPr lang="en-US"/>
           </a:p>
@@ -2257,7 +2257,7 @@
           <a:p>
             <a:fld id="{34621E95-60A9-FF44-9869-513D9D7A859F}" type="datetime2">
               <a:rPr lang="en-US" smtClean="0"/>
-              <a:t>Monday, September 8, 14</a:t>
+              <a:t>Tuesday, September 9, 14</a:t>
             </a:fld>
             <a:endParaRPr lang="en-US"/>
           </a:p>
@@ -2376,7 +2376,7 @@
           <a:p>
             <a:fld id="{BD5AFB16-13FE-DF4A-8CB7-09756A57B2EA}" type="datetime2">
               <a:rPr lang="en-US" smtClean="0"/>
-              <a:t>Monday, September 8, 14</a:t>
+              <a:t>Tuesday, September 9, 14</a:t>
             </a:fld>
             <a:endParaRPr lang="en-US" dirty="0"/>
           </a:p>
@@ -2863,7 +2863,7 @@
           <a:p>
             <a:fld id="{1BDEC705-8EA9-6C46-8E3B-2CAC7E2C0F7D}" type="datetime2">
               <a:rPr lang="en-US" smtClean="0"/>
-              <a:t>Monday, September 8, 14</a:t>
+              <a:t>Tuesday, September 9, 14</a:t>
             </a:fld>
             <a:endParaRPr lang="en-US"/>
           </a:p>
@@ -3194,7 +3194,7 @@
           <a:p>
             <a:fld id="{BF613BD3-C5FD-9543-B738-679BF38D8C83}" type="datetime2">
               <a:rPr lang="en-US" smtClean="0"/>
-              <a:t>Monday, September 8, 14</a:t>
+              <a:t>Tuesday, September 9, 14</a:t>
             </a:fld>
             <a:endParaRPr lang="en-US" dirty="0"/>
           </a:p>
@@ -3673,7 +3673,7 @@
           <a:p>
             <a:fld id="{4B5E4F0C-9A9C-5448-99FD-D30288B385C9}" type="datetime2">
               <a:rPr lang="en-US" smtClean="0"/>
-              <a:t>Monday, September 8, 14</a:t>
+              <a:t>Tuesday, September 9, 14</a:t>
             </a:fld>
             <a:endParaRPr lang="en-US"/>
           </a:p>
@@ -3969,7 +3969,7 @@
           <a:p>
             <a:fld id="{30545249-FD76-6844-B252-CAB05FC2DAA8}" type="datetime2">
               <a:rPr lang="en-US" smtClean="0"/>
-              <a:t>Monday, September 8, 14</a:t>
+              <a:t>Tuesday, September 9, 14</a:t>
             </a:fld>
             <a:endParaRPr lang="en-US" dirty="0"/>
           </a:p>
@@ -4213,7 +4213,7 @@
           <a:p>
             <a:fld id="{CC859171-EEDD-0B48-A5C0-E7218AE20EA7}" type="datetime2">
               <a:rPr lang="en-US" smtClean="0"/>
-              <a:t>Monday, September 8, 14</a:t>
+              <a:t>Tuesday, September 9, 14</a:t>
             </a:fld>
             <a:endParaRPr lang="en-US"/>
           </a:p>
@@ -4309,7 +4309,7 @@
           <a:p>
             <a:fld id="{C32F9216-0342-7440-9504-BD6C1382BF27}" type="datetime2">
               <a:rPr lang="en-US" smtClean="0"/>
-              <a:t>Monday, September 8, 14</a:t>
+              <a:t>Tuesday, September 9, 14</a:t>
             </a:fld>
             <a:endParaRPr lang="en-US"/>
           </a:p>
@@ -4580,7 +4580,7 @@
           <a:p>
             <a:fld id="{D36DC8F2-AD63-E841-8C23-5DC3A41041BE}" type="datetime2">
               <a:rPr lang="en-US" smtClean="0"/>
-              <a:t>Monday, September 8, 14</a:t>
+              <a:t>Tuesday, September 9, 14</a:t>
             </a:fld>
             <a:endParaRPr lang="en-US" dirty="0"/>
           </a:p>
@@ -5299,7 +5299,7 @@
           <a:p>
             <a:fld id="{D0913AF4-ACC5-3549-B060-3D77093E2559}" type="datetime2">
               <a:rPr lang="en-US" smtClean="0"/>
-              <a:t>Monday, September 8, 14</a:t>
+              <a:t>Tuesday, September 9, 14</a:t>
             </a:fld>
             <a:endParaRPr lang="en-US"/>
           </a:p>
@@ -5756,7 +5756,7 @@
         <p:spPr>
           <a:xfrm>
             <a:off x="457200" y="3335291"/>
-            <a:ext cx="8229600" cy="2844965"/>
+            <a:ext cx="8229600" cy="3026804"/>
           </a:xfrm>
           <a:solidFill>
             <a:srgbClr val="CCD1D9"/>
@@ -5815,153 +5815,159 @@
               <a:t>hello.decl.h</a:t>
             </a:r>
             <a:r>
+              <a:rPr lang="en-US" dirty="0" smtClean="0"/>
+              <a:t>”</a:t>
+            </a:r>
+          </a:p>
+          <a:p>
+            <a:pPr marL="0" indent="0">
+              <a:buNone/>
+            </a:pPr>
+            <a:endParaRPr lang="en-US" dirty="0"/>
+          </a:p>
+          <a:p>
+            <a:pPr marL="0" indent="0">
+              <a:buNone/>
+            </a:pPr>
+            <a:r>
+              <a:rPr lang="en-US" dirty="0"/>
+              <a:t>class Main : </a:t>
+            </a:r>
+            <a:r>
+              <a:rPr lang="en-US" b="1" dirty="0"/>
+              <a:t>public</a:t>
+            </a:r>
+            <a:r>
+              <a:rPr lang="en-US" dirty="0"/>
+              <a:t> </a:t>
+            </a:r>
+            <a:r>
+              <a:rPr lang="en-US" dirty="0" err="1"/>
+              <a:t>CBase</a:t>
+            </a:r>
+            <a:r>
+              <a:rPr lang="en-US" dirty="0"/>
+              <a:t> Main { </a:t>
+            </a:r>
+            <a:endParaRPr lang="en-US" dirty="0" smtClean="0"/>
+          </a:p>
+          <a:p>
+            <a:pPr marL="0" indent="0">
+              <a:buNone/>
+            </a:pPr>
+            <a:r>
+              <a:rPr lang="en-US" b="1" dirty="0" smtClean="0"/>
+              <a:t>   public</a:t>
+            </a:r>
+            <a:r>
+              <a:rPr lang="en-US" dirty="0"/>
+              <a:t>: Main(</a:t>
+            </a:r>
+            <a:r>
+              <a:rPr lang="en-US" dirty="0" err="1"/>
+              <a:t>CkArgMsg</a:t>
+            </a:r>
+            <a:r>
+              <a:rPr lang="en-US" dirty="0"/>
+              <a:t>∗ m) {</a:t>
+            </a:r>
+          </a:p>
+          <a:p>
+            <a:pPr marL="0" indent="0">
+              <a:buNone/>
+            </a:pPr>
+            <a:r>
+              <a:rPr lang="en-US" dirty="0" smtClean="0"/>
+              <a:t>      </a:t>
+            </a:r>
+            <a:r>
+              <a:rPr lang="en-US" dirty="0" err="1" smtClean="0"/>
+              <a:t>ckout</a:t>
+            </a:r>
+            <a:r>
+              <a:rPr lang="en-US" dirty="0" smtClean="0"/>
+              <a:t> </a:t>
+            </a:r>
+            <a:r>
+              <a:rPr lang="en-US" dirty="0"/>
+              <a:t>&lt;&lt; ”Hello World!” &lt;&lt; </a:t>
+            </a:r>
+            <a:r>
+              <a:rPr lang="en-US" dirty="0" err="1"/>
+              <a:t>endl</a:t>
+            </a:r>
+            <a:r>
+              <a:rPr lang="en-US" dirty="0"/>
+              <a:t>; </a:t>
+            </a:r>
+            <a:endParaRPr lang="en-US" dirty="0" smtClean="0"/>
+          </a:p>
+          <a:p>
+            <a:pPr marL="0" indent="0">
+              <a:buNone/>
+            </a:pPr>
+            <a:r>
+              <a:rPr lang="en-US" dirty="0" smtClean="0"/>
+              <a:t>      </a:t>
+            </a:r>
+            <a:r>
+              <a:rPr lang="en-US" dirty="0" err="1" smtClean="0"/>
+              <a:t>CkExit</a:t>
+            </a:r>
+            <a:r>
+              <a:rPr lang="en-US" dirty="0"/>
+              <a:t>();</a:t>
+            </a:r>
+          </a:p>
+          <a:p>
+            <a:pPr marL="0" indent="0">
+              <a:buNone/>
+            </a:pPr>
+            <a:r>
+              <a:rPr lang="en-US" dirty="0" smtClean="0"/>
+              <a:t>   }</a:t>
+            </a:r>
+            <a:r>
+              <a:rPr lang="en-US" dirty="0"/>
+              <a:t>; </a:t>
+            </a:r>
+            <a:endParaRPr lang="en-US" dirty="0" smtClean="0"/>
+          </a:p>
+          <a:p>
+            <a:pPr marL="0" indent="0">
+              <a:buNone/>
+            </a:pPr>
+            <a:r>
+              <a:rPr lang="en-US" dirty="0" smtClean="0"/>
+              <a:t>};</a:t>
+            </a:r>
+          </a:p>
+          <a:p>
+            <a:pPr marL="0" indent="0">
+              <a:buNone/>
+            </a:pPr>
+            <a:endParaRPr lang="en-US" dirty="0"/>
+          </a:p>
+          <a:p>
+            <a:pPr marL="0" indent="0">
+              <a:buNone/>
+            </a:pPr>
+            <a:r>
+              <a:rPr lang="en-US" b="1" dirty="0"/>
+              <a:t>#include </a:t>
+            </a:r>
+            <a:r>
               <a:rPr lang="en-US" dirty="0"/>
               <a:t>”</a:t>
             </a:r>
-          </a:p>
-          <a:p>
-            <a:pPr marL="0" indent="0">
-              <a:buNone/>
-            </a:pPr>
-            <a:r>
-              <a:rPr lang="en-US" dirty="0"/>
-              <a:t>class Main : </a:t>
-            </a:r>
-            <a:r>
-              <a:rPr lang="en-US" b="1" dirty="0"/>
-              <a:t>public</a:t>
-            </a:r>
-            <a:r>
-              <a:rPr lang="en-US" dirty="0"/>
-              <a:t> </a:t>
-            </a:r>
             <a:r>
               <a:rPr lang="en-US" dirty="0" err="1"/>
-              <a:t>CBase</a:t>
-            </a:r>
-            <a:r>
-              <a:rPr lang="en-US" dirty="0"/>
-              <a:t> Main { </a:t>
-            </a:r>
-            <a:endParaRPr lang="en-US" dirty="0" smtClean="0"/>
-          </a:p>
-          <a:p>
-            <a:pPr marL="0" indent="0">
-              <a:buNone/>
-            </a:pPr>
-            <a:r>
-              <a:rPr lang="en-US" b="1" dirty="0" smtClean="0"/>
-              <a:t>   public</a:t>
-            </a:r>
-            <a:r>
-              <a:rPr lang="en-US" dirty="0"/>
-              <a:t>: Main(</a:t>
-            </a:r>
-            <a:r>
-              <a:rPr lang="en-US" dirty="0" err="1"/>
-              <a:t>CkArgMsg</a:t>
-            </a:r>
-            <a:r>
-              <a:rPr lang="en-US" dirty="0"/>
-              <a:t>∗ m) {</a:t>
-            </a:r>
-          </a:p>
-          <a:p>
-            <a:pPr marL="0" indent="0">
-              <a:buNone/>
-            </a:pPr>
-            <a:r>
-              <a:rPr lang="en-US" dirty="0" smtClean="0"/>
-              <a:t>      </a:t>
-            </a:r>
-            <a:r>
-              <a:rPr lang="en-US" dirty="0" err="1" smtClean="0"/>
-              <a:t>ckout</a:t>
-            </a:r>
-            <a:r>
-              <a:rPr lang="en-US" dirty="0" smtClean="0"/>
-              <a:t> </a:t>
-            </a:r>
-            <a:r>
-              <a:rPr lang="en-US" dirty="0"/>
-              <a:t>&lt;&lt; ”Hello World!” &lt;&lt; </a:t>
-            </a:r>
-            <a:r>
-              <a:rPr lang="en-US" dirty="0" err="1"/>
-              <a:t>endl</a:t>
-            </a:r>
-            <a:r>
-              <a:rPr lang="en-US" dirty="0"/>
-              <a:t>; </a:t>
-            </a:r>
-            <a:endParaRPr lang="en-US" dirty="0" smtClean="0"/>
-          </a:p>
-          <a:p>
-            <a:pPr marL="0" indent="0">
-              <a:buNone/>
-            </a:pPr>
-            <a:r>
-              <a:rPr lang="en-US" dirty="0" smtClean="0"/>
-              <a:t>      </a:t>
-            </a:r>
-            <a:r>
-              <a:rPr lang="en-US" dirty="0" err="1" smtClean="0"/>
-              <a:t>CkExit</a:t>
-            </a:r>
-            <a:r>
-              <a:rPr lang="en-US" dirty="0"/>
-              <a:t>();</a:t>
-            </a:r>
-          </a:p>
-          <a:p>
-            <a:pPr marL="0" indent="0">
-              <a:buNone/>
-            </a:pPr>
-            <a:r>
-              <a:rPr lang="en-US" dirty="0" smtClean="0"/>
-              <a:t>   }</a:t>
-            </a:r>
-            <a:r>
-              <a:rPr lang="en-US" dirty="0"/>
-              <a:t>; </a:t>
-            </a:r>
-            <a:endParaRPr lang="en-US" dirty="0" smtClean="0"/>
-          </a:p>
-          <a:p>
-            <a:pPr marL="0" indent="0">
-              <a:buNone/>
-            </a:pPr>
-            <a:r>
-              <a:rPr lang="en-US" dirty="0" smtClean="0"/>
-              <a:t>};</a:t>
-            </a:r>
-          </a:p>
-          <a:p>
-            <a:pPr marL="0" indent="0">
-              <a:buNone/>
-            </a:pPr>
-            <a:endParaRPr lang="en-US" dirty="0"/>
-          </a:p>
-          <a:p>
-            <a:pPr marL="0" indent="0">
-              <a:buNone/>
-            </a:pPr>
-            <a:r>
-              <a:rPr lang="en-US" b="1" dirty="0"/>
-              <a:t>#include </a:t>
+              <a:t>hello.def.h</a:t>
             </a:r>
             <a:r>
               <a:rPr lang="en-US" dirty="0"/>
               <a:t>”</a:t>
             </a:r>
-            <a:r>
-              <a:rPr lang="en-US" dirty="0" err="1"/>
-              <a:t>hello.def.h</a:t>
-            </a:r>
-            <a:r>
-              <a:rPr lang="en-US" dirty="0"/>
-              <a:t>”</a:t>
-            </a:r>
           </a:p>
         </p:txBody>
       </p:sp>
@@ -5982,7 +5988,7 @@
           <a:p>
             <a:fld id="{49648AE8-270A-8E4F-8CA2-BC696C306F18}" type="datetime2">
               <a:rPr lang="en-US" smtClean="0"/>
-              <a:t>Monday, September 8, 14</a:t>
+              <a:t>Tuesday, September 9, 14</a:t>
             </a:fld>
             <a:endParaRPr lang="en-US" dirty="0"/>
           </a:p>
@@ -6507,60 +6513,92 @@
               <a:rPr lang="en-US" dirty="0">
                 <a:latin typeface="+mn-lt"/>
               </a:rPr>
-              <a:t> ”</a:t>
-            </a:r>
-            <a:r>
-              <a:rPr lang="en-US" dirty="0" err="1">
+              <a:t> </a:t>
+            </a:r>
+            <a:r>
+              <a:rPr lang="en-US" dirty="0" smtClean="0">
+                <a:latin typeface="+mn-lt"/>
+              </a:rPr>
+              <a:t>“</a:t>
+            </a:r>
+            <a:r>
+              <a:rPr lang="en-US" dirty="0" err="1" smtClean="0">
                 <a:latin typeface="+mn-lt"/>
               </a:rPr>
               <a:t>hello.decl.h</a:t>
             </a:r>
             <a:r>
+              <a:rPr lang="en-US" dirty="0" smtClean="0">
+                <a:latin typeface="+mn-lt"/>
+              </a:rPr>
+              <a:t>”</a:t>
+            </a:r>
+          </a:p>
+          <a:p>
+            <a:pPr marL="0" indent="0">
+              <a:buNone/>
+            </a:pPr>
+            <a:endParaRPr lang="en-US" dirty="0">
+              <a:latin typeface="+mn-lt"/>
+            </a:endParaRPr>
+          </a:p>
+          <a:p>
+            <a:pPr marL="0" indent="0">
+              <a:buNone/>
+            </a:pPr>
+            <a:r>
+              <a:rPr lang="en-US" b="1" dirty="0">
+                <a:latin typeface="+mn-lt"/>
+              </a:rPr>
+              <a:t>class</a:t>
+            </a:r>
+            <a:r>
               <a:rPr lang="en-US" dirty="0">
                 <a:latin typeface="+mn-lt"/>
               </a:rPr>
-              <a:t>”</a:t>
-            </a:r>
-          </a:p>
-          <a:p>
-            <a:pPr marL="0" indent="0">
-              <a:buNone/>
-            </a:pPr>
+              <a:t> Main : </a:t>
+            </a:r>
             <a:r>
               <a:rPr lang="en-US" b="1" dirty="0">
                 <a:latin typeface="+mn-lt"/>
               </a:rPr>
-              <a:t>class</a:t>
+              <a:t>public</a:t>
             </a:r>
             <a:r>
               <a:rPr lang="en-US" dirty="0">
                 <a:latin typeface="+mn-lt"/>
               </a:rPr>
-              <a:t> Main : </a:t>
-            </a:r>
-            <a:r>
-              <a:rPr lang="en-US" b="1" dirty="0">
-                <a:latin typeface="+mn-lt"/>
-              </a:rPr>
-              <a:t>public</a:t>
+              <a:t> </a:t>
+            </a:r>
+            <a:r>
+              <a:rPr lang="en-US" dirty="0" err="1" smtClean="0">
+                <a:latin typeface="+mn-lt"/>
+              </a:rPr>
+              <a:t>CBase</a:t>
+            </a:r>
+            <a:r>
+              <a:rPr lang="en-US" dirty="0" err="1" smtClean="0">
+                <a:latin typeface="+mn-lt"/>
+              </a:rPr>
+              <a:t>_</a:t>
+            </a:r>
+            <a:r>
+              <a:rPr lang="en-US" dirty="0" err="1" smtClean="0">
+                <a:latin typeface="+mn-lt"/>
+              </a:rPr>
+              <a:t>Main</a:t>
+            </a:r>
+            <a:r>
+              <a:rPr lang="en-US" dirty="0" smtClean="0">
+                <a:latin typeface="+mn-lt"/>
+              </a:rPr>
+              <a:t> </a:t>
             </a:r>
             <a:r>
               <a:rPr lang="en-US" dirty="0">
                 <a:latin typeface="+mn-lt"/>
               </a:rPr>
-              <a:t> </a:t>
-            </a:r>
-            <a:r>
-              <a:rPr lang="en-US" dirty="0" err="1">
-                <a:latin typeface="+mn-lt"/>
-              </a:rPr>
-              <a:t>CBase</a:t>
-            </a:r>
-            <a:r>
-              <a:rPr lang="en-US" dirty="0">
-                <a:latin typeface="+mn-lt"/>
-              </a:rPr>
-              <a:t> Main { </a:t>
+              <a:t>{ </a:t>
             </a:r>
             <a:endParaRPr lang="en-US" dirty="0" smtClean="0">
               <a:latin typeface="+mn-lt"/>
@@ -6624,16 +6662,22 @@
               <a:t>CProxy</a:t>
             </a:r>
             <a:r>
-              <a:rPr lang="en-US" dirty="0" smtClean="0">
-                <a:latin typeface="+mn-lt"/>
-              </a:rPr>
-              <a:t> </a:t>
+              <a:rPr lang="en-US" dirty="0" err="1" smtClean="0">
+                <a:latin typeface="+mn-lt"/>
+              </a:rPr>
+              <a:t>_</a:t>
+            </a:r>
+            <a:r>
+              <a:rPr lang="en-US" dirty="0" err="1" smtClean="0">
+                <a:latin typeface="+mn-lt"/>
+              </a:rPr>
+              <a:t>Singleton</a:t>
             </a:r>
             <a:r>
               <a:rPr lang="en-US" dirty="0">
                 <a:latin typeface="+mn-lt"/>
               </a:rPr>
-              <a:t>Singleton::</a:t>
+              <a:t>::</a:t>
             </a:r>
             <a:r>
               <a:rPr lang="en-US" dirty="0" err="1">
@@ -6743,6 +6787,18 @@
               <a:t>CBase</a:t>
             </a:r>
             <a:r>
+              <a:rPr lang="en-US" dirty="0" err="1" smtClean="0">
+                <a:latin typeface="+mn-lt"/>
+              </a:rPr>
+              <a:t>_</a:t>
+            </a:r>
+            <a:r>
+              <a:rPr lang="en-US" dirty="0" err="1" smtClean="0">
+                <a:latin typeface="+mn-lt"/>
+              </a:rPr>
+              <a:t>Singleton</a:t>
+            </a:r>
+            <a:r>
               <a:rPr lang="en-US" dirty="0" smtClean="0">
                 <a:latin typeface="+mn-lt"/>
               </a:rPr>
@@ -6752,7 +6808,7 @@
               <a:rPr lang="en-US" dirty="0">
                 <a:latin typeface="+mn-lt"/>
               </a:rPr>
-              <a:t>Singleton { </a:t>
+              <a:t>{ </a:t>
             </a:r>
             <a:endParaRPr lang="en-US" dirty="0" smtClean="0">
               <a:latin typeface="+mn-lt"/>
@@ -6945,7 +7001,7 @@
           <a:p>
             <a:fld id="{4E245537-FD01-C04E-9FE8-74F7CCF20F26}" type="datetime2">
               <a:rPr lang="en-US" smtClean="0"/>
-              <a:t>Monday, September 8, 14</a:t>
+              <a:t>Tuesday, September 9, 14</a:t>
             </a:fld>
             <a:endParaRPr lang="en-US" dirty="0"/>
           </a:p>
@@ -7102,7 +7158,7 @@
           <a:p>
             <a:fld id="{2A453F59-66CD-474C-80FB-0E2B578AA752}" type="datetime2">
               <a:rPr lang="en-US" smtClean="0"/>
-              <a:t>Monday, September 8, 14</a:t>
+              <a:t>Tuesday, September 9, 14</a:t>
             </a:fld>
             <a:endParaRPr lang="en-US"/>
           </a:p>
@@ -7281,11 +7337,35 @@
           <a:p>
             <a:r>
               <a:rPr lang="en-US" dirty="0"/>
-              <a:t>ARCH = net-linux-x86 64, multicore-darwin-x86 64, </a:t>
+              <a:t>ARCH = net-linux-</a:t>
+            </a:r>
+            <a:r>
+              <a:rPr lang="en-US" dirty="0" smtClean="0"/>
+              <a:t>x86_64</a:t>
+            </a:r>
+            <a:r>
+              <a:rPr lang="en-US" dirty="0"/>
+              <a:t>, multicore-darwin-</a:t>
+            </a:r>
+            <a:r>
+              <a:rPr lang="en-US" dirty="0" smtClean="0"/>
+              <a:t>x86_64</a:t>
+            </a:r>
+            <a:r>
+              <a:rPr lang="en-US" dirty="0"/>
+              <a:t>, </a:t>
+            </a:r>
+            <a:r>
+              <a:rPr lang="en-US" dirty="0" smtClean="0"/>
+              <a:t> </a:t>
+            </a:r>
+            <a:r>
+              <a:rPr lang="en-US" dirty="0" err="1" smtClean="0"/>
+              <a:t>pamilrts</a:t>
             </a:r>
             <a:r>
               <a:rPr lang="en-US" dirty="0" err="1"/>
-              <a:t>pamilrts-bluegeneq</a:t>
+              <a:t>-bluegeneq</a:t>
             </a:r>
             <a:r>
               <a:rPr lang="en-US" dirty="0"/>
@@ -7295,7 +7375,23 @@
           <a:p>
             <a:r>
               <a:rPr lang="en-US" dirty="0"/>
-              <a:t>OPTS = –with-production, –enable-tracing, </a:t>
+              <a:t>OPTS = </a:t>
+            </a:r>
+            <a:r>
+              <a:rPr lang="en-US" dirty="0" smtClean="0"/>
+              <a:t>--with</a:t>
+            </a:r>
+            <a:r>
+              <a:rPr lang="en-US" dirty="0"/>
+              <a:t>-production, </a:t>
+            </a:r>
+            <a:r>
+              <a:rPr lang="en-US" dirty="0" smtClean="0"/>
+              <a:t>--enable</a:t>
+            </a:r>
+            <a:r>
+              <a:rPr lang="en-US" dirty="0"/>
+              <a:t>-tracing, </a:t>
             </a:r>
             <a:r>
               <a:rPr lang="en-US" dirty="0" err="1"/>
@@ -7360,7 +7456,7 @@
           <a:p>
             <a:fld id="{5E92D53F-7FBE-A64C-93CF-96420A1E5265}" type="datetime2">
               <a:rPr lang="en-US" smtClean="0"/>
-              <a:t>Monday, September 8, 14</a:t>
+              <a:t>Tuesday, September 9, 14</a:t>
             </a:fld>
             <a:endParaRPr lang="en-US"/>
           </a:p>
@@ -7607,7 +7703,7 @@
           <a:p>
             <a:fld id="{FF29F566-044B-7448-9BD6-90F1761B0BF9}" type="datetime2">
               <a:rPr lang="en-US" smtClean="0"/>
-              <a:t>Monday, September 8, 14</a:t>
+              <a:t>Tuesday, September 9, 14</a:t>
             </a:fld>
             <a:endParaRPr lang="en-US"/>
           </a:p>

</xml_diff>

<commit_message>
modified tutorial 02, 04, 05, 06
</commit_message>
<xml_diff>
--- a/tutorial-02-hello_world.pptx
+++ b/tutorial-02-hello_world.pptx
@@ -2,7 +2,7 @@
 <file path=ppt/presentation.xml><?xml version="1.0" encoding="utf-8"?>
 <p:presentation xmlns:a="http://schemas.openxmlformats.org/drawingml/2006/main" xmlns:r="http://schemas.openxmlformats.org/officeDocument/2006/relationships" xmlns:p="http://schemas.openxmlformats.org/presentationml/2006/main" showSpecialPlsOnTitleSld="0" saveSubsetFonts="1">
   <p:sldMasterIdLst>
-    <p:sldMasterId id="2147483974" r:id="rId1"/>
+    <p:sldMasterId id="2147483988" r:id="rId1"/>
   </p:sldMasterIdLst>
   <p:notesMasterIdLst>
     <p:notesMasterId r:id="rId8"/>
@@ -6028,7 +6028,7 @@
           <a:bodyPr vert="horz" lIns="91440" tIns="45720" rIns="91440" bIns="45720" rtlCol="0" anchor="ctr"/>
           <a:lstStyle>
             <a:lvl1pPr algn="ctr">
-              <a:defRPr sz="1200" b="1">
+              <a:defRPr sz="1200" b="0">
                 <a:solidFill>
                   <a:srgbClr val="FFFFFF"/>
                 </a:solidFill>
@@ -6234,19 +6234,19 @@
   </p:cSld>
   <p:clrMap bg1="lt1" tx1="dk1" bg2="lt2" tx2="dk2" accent1="accent1" accent2="accent2" accent3="accent3" accent4="accent4" accent5="accent5" accent6="accent6" hlink="hlink" folHlink="folHlink"/>
   <p:sldLayoutIdLst>
-    <p:sldLayoutId id="2147483975" r:id="rId1"/>
-    <p:sldLayoutId id="2147483976" r:id="rId2"/>
-    <p:sldLayoutId id="2147483977" r:id="rId3"/>
-    <p:sldLayoutId id="2147483978" r:id="rId4"/>
-    <p:sldLayoutId id="2147483979" r:id="rId5"/>
-    <p:sldLayoutId id="2147483980" r:id="rId6"/>
-    <p:sldLayoutId id="2147483981" r:id="rId7"/>
-    <p:sldLayoutId id="2147483982" r:id="rId8"/>
-    <p:sldLayoutId id="2147483983" r:id="rId9"/>
-    <p:sldLayoutId id="2147483984" r:id="rId10"/>
-    <p:sldLayoutId id="2147483985" r:id="rId11"/>
-    <p:sldLayoutId id="2147483986" r:id="rId12"/>
-    <p:sldLayoutId id="2147483987" r:id="rId13"/>
+    <p:sldLayoutId id="2147483989" r:id="rId1"/>
+    <p:sldLayoutId id="2147483990" r:id="rId2"/>
+    <p:sldLayoutId id="2147483991" r:id="rId3"/>
+    <p:sldLayoutId id="2147483992" r:id="rId4"/>
+    <p:sldLayoutId id="2147483993" r:id="rId5"/>
+    <p:sldLayoutId id="2147483994" r:id="rId6"/>
+    <p:sldLayoutId id="2147483995" r:id="rId7"/>
+    <p:sldLayoutId id="2147483996" r:id="rId8"/>
+    <p:sldLayoutId id="2147483997" r:id="rId9"/>
+    <p:sldLayoutId id="2147483998" r:id="rId10"/>
+    <p:sldLayoutId id="2147483999" r:id="rId11"/>
+    <p:sldLayoutId id="2147484000" r:id="rId12"/>
+    <p:sldLayoutId id="2147484001" r:id="rId13"/>
     <p:sldLayoutId id="2147483961" r:id="rId14"/>
     <p:sldLayoutId id="2147483973" r:id="rId15"/>
     <p:sldLayoutId id="2147483972" r:id="rId16"/>

</xml_diff>

<commit_message>
modifed tutorials 02-12 updating header/footer
</commit_message>
<xml_diff>
--- a/tutorial-02-hello_world.pptx
+++ b/tutorial-02-hello_world.pptx
@@ -2,7 +2,7 @@
 <file path=ppt/presentation.xml><?xml version="1.0" encoding="utf-8"?>
 <p:presentation xmlns:a="http://schemas.openxmlformats.org/drawingml/2006/main" xmlns:r="http://schemas.openxmlformats.org/officeDocument/2006/relationships" xmlns:p="http://schemas.openxmlformats.org/presentationml/2006/main" showSpecialPlsOnTitleSld="0" saveSubsetFonts="1">
   <p:sldMasterIdLst>
-    <p:sldMasterId id="2147483988" r:id="rId1"/>
+    <p:sldMasterId id="2147484002" r:id="rId1"/>
   </p:sldMasterIdLst>
   <p:notesMasterIdLst>
     <p:notesMasterId r:id="rId8"/>
@@ -206,7 +206,7 @@
           <a:p>
             <a:fld id="{775CE290-E0F5-444C-B849-A8F17CD4104C}" type="datetimeFigureOut">
               <a:rPr lang="en-US" smtClean="0"/>
-              <a:t>9/10/14</a:t>
+              <a:t>9/12/14</a:t>
             </a:fld>
             <a:endParaRPr lang="en-US"/>
           </a:p>
@@ -372,7 +372,7 @@
           <a:p>
             <a:fld id="{AD53A24C-4135-094C-957B-35852E7EDFA4}" type="datetimeFigureOut">
               <a:rPr lang="en-US" smtClean="0"/>
-              <a:t>9/10/14</a:t>
+              <a:t>9/12/14</a:t>
             </a:fld>
             <a:endParaRPr lang="en-US"/>
           </a:p>
@@ -831,9 +831,9 @@
           <a:bodyPr/>
           <a:lstStyle/>
           <a:p>
-            <a:fld id="{B594EA25-E4F4-3746-A0BA-A11E27330E0F}" type="datetime2">
-              <a:rPr lang="en-US" smtClean="0"/>
-              <a:t>Wednesday, September 10, 14</a:t>
+            <a:fld id="{3652D34B-1481-1D4E-B09A-E41225373634}" type="datetime2">
+              <a:rPr lang="en-US" smtClean="0"/>
+              <a:t>Friday, September 12, 14</a:t>
             </a:fld>
             <a:endParaRPr lang="en-US"/>
           </a:p>
@@ -857,7 +857,7 @@
             <a:pPr algn="r"/>
             <a:r>
               <a:rPr lang="en-US" smtClean="0"/>
-              <a:t>Sanjay Kalé and PPL (UIUC) – Parallel Migratable Objects </a:t>
+              <a:t>Laxmikant Kalé and PPL (UIUC) – Parallel Migratable Objects </a:t>
             </a:r>
             <a:endParaRPr lang="en-US" dirty="0"/>
           </a:p>
@@ -1136,7 +1136,7 @@
                 <a:latin typeface="Times New Roman"/>
                 <a:cs typeface="Times New Roman"/>
               </a:rPr>
-              <a:t>September 10, 2014</a:t>
+              <a:t>September 12, 2014</a:t>
             </a:fld>
             <a:endParaRPr lang="en-US" dirty="0">
               <a:latin typeface="Times New Roman"/>
@@ -1202,7 +1202,7 @@
           <p:cNvSpPr txBox="1">
             <a:spLocks/>
           </p:cNvSpPr>
-          <p:nvPr userDrawn="1"/>
+          <p:nvPr/>
         </p:nvSpPr>
         <p:spPr>
           <a:xfrm>
@@ -1410,7 +1410,230 @@
                 <a:latin typeface="Times New Roman"/>
                 <a:cs typeface="Times New Roman"/>
               </a:rPr>
-              <a:t>September 10, 2014</a:t>
+              <a:t>September 12, 2014</a:t>
+            </a:fld>
+            <a:endParaRPr lang="en-US" dirty="0">
+              <a:latin typeface="Times New Roman"/>
+              <a:cs typeface="Times New Roman"/>
+            </a:endParaRPr>
+          </a:p>
+        </p:txBody>
+      </p:sp>
+      <p:sp>
+        <p:nvSpPr>
+          <p:cNvPr id="12" name="Subtitle 2"/>
+          <p:cNvSpPr txBox="1">
+            <a:spLocks/>
+          </p:cNvSpPr>
+          <p:nvPr userDrawn="1"/>
+        </p:nvSpPr>
+        <p:spPr>
+          <a:xfrm>
+            <a:off x="1404926" y="4774277"/>
+            <a:ext cx="6400800" cy="700402"/>
+          </a:xfrm>
+          <a:prstGeom prst="rect">
+            <a:avLst/>
+          </a:prstGeom>
+        </p:spPr>
+        <p:txBody>
+          <a:bodyPr vert="horz" lIns="91440" tIns="45720" rIns="91440" bIns="45720" rtlCol="0">
+            <a:normAutofit/>
+          </a:bodyPr>
+          <a:lstStyle>
+            <a:lvl1pPr marL="0" indent="0" algn="ctr" defTabSz="914400" rtl="0" eaLnBrk="1" latinLnBrk="0" hangingPunct="1">
+              <a:spcBef>
+                <a:spcPct val="20000"/>
+              </a:spcBef>
+              <a:buClr>
+                <a:schemeClr val="accent1"/>
+              </a:buClr>
+              <a:buSzPct val="85000"/>
+              <a:buFont typeface="Arial" pitchFamily="34" charset="0"/>
+              <a:buNone/>
+              <a:defRPr sz="2400" kern="1200">
+                <a:solidFill>
+                  <a:schemeClr val="tx1">
+                    <a:lumMod val="75000"/>
+                    <a:lumOff val="25000"/>
+                  </a:schemeClr>
+                </a:solidFill>
+                <a:latin typeface="+mn-lt"/>
+                <a:ea typeface="+mn-ea"/>
+                <a:cs typeface="+mn-cs"/>
+              </a:defRPr>
+            </a:lvl1pPr>
+            <a:lvl2pPr marL="457200" indent="0" algn="ctr" defTabSz="914400" rtl="0" eaLnBrk="1" latinLnBrk="0" hangingPunct="1">
+              <a:spcBef>
+                <a:spcPct val="20000"/>
+              </a:spcBef>
+              <a:buClr>
+                <a:schemeClr val="accent1"/>
+              </a:buClr>
+              <a:buSzPct val="85000"/>
+              <a:buFont typeface="Arial" pitchFamily="34" charset="0"/>
+              <a:buNone/>
+              <a:defRPr sz="2000" kern="1200">
+                <a:solidFill>
+                  <a:schemeClr val="tx1">
+                    <a:tint val="75000"/>
+                  </a:schemeClr>
+                </a:solidFill>
+                <a:latin typeface="+mn-lt"/>
+                <a:ea typeface="+mn-ea"/>
+                <a:cs typeface="+mn-cs"/>
+              </a:defRPr>
+            </a:lvl2pPr>
+            <a:lvl3pPr marL="914400" indent="0" algn="ctr" defTabSz="914400" rtl="0" eaLnBrk="1" latinLnBrk="0" hangingPunct="1">
+              <a:spcBef>
+                <a:spcPct val="20000"/>
+              </a:spcBef>
+              <a:buClr>
+                <a:schemeClr val="accent1"/>
+              </a:buClr>
+              <a:buSzPct val="90000"/>
+              <a:buFont typeface="Arial" pitchFamily="34" charset="0"/>
+              <a:buNone/>
+              <a:defRPr sz="1800" kern="1200">
+                <a:solidFill>
+                  <a:schemeClr val="tx1">
+                    <a:tint val="75000"/>
+                  </a:schemeClr>
+                </a:solidFill>
+                <a:latin typeface="+mn-lt"/>
+                <a:ea typeface="+mn-ea"/>
+                <a:cs typeface="+mn-cs"/>
+              </a:defRPr>
+            </a:lvl3pPr>
+            <a:lvl4pPr marL="1371600" indent="0" algn="ctr" defTabSz="914400" rtl="0" eaLnBrk="1" latinLnBrk="0" hangingPunct="1">
+              <a:spcBef>
+                <a:spcPct val="20000"/>
+              </a:spcBef>
+              <a:buClr>
+                <a:schemeClr val="accent1"/>
+              </a:buClr>
+              <a:buFont typeface="Arial" pitchFamily="34" charset="0"/>
+              <a:buNone/>
+              <a:defRPr sz="1600" kern="1200">
+                <a:solidFill>
+                  <a:schemeClr val="tx1">
+                    <a:tint val="75000"/>
+                  </a:schemeClr>
+                </a:solidFill>
+                <a:latin typeface="+mn-lt"/>
+                <a:ea typeface="+mn-ea"/>
+                <a:cs typeface="+mn-cs"/>
+              </a:defRPr>
+            </a:lvl4pPr>
+            <a:lvl5pPr marL="1828800" indent="0" algn="ctr" defTabSz="914400" rtl="0" eaLnBrk="1" latinLnBrk="0" hangingPunct="1">
+              <a:spcBef>
+                <a:spcPct val="20000"/>
+              </a:spcBef>
+              <a:buClr>
+                <a:schemeClr val="accent1"/>
+              </a:buClr>
+              <a:buSzPct val="100000"/>
+              <a:buFont typeface="Arial" pitchFamily="34" charset="0"/>
+              <a:buNone/>
+              <a:defRPr sz="1400" kern="1200" baseline="0">
+                <a:solidFill>
+                  <a:schemeClr val="tx1">
+                    <a:tint val="75000"/>
+                  </a:schemeClr>
+                </a:solidFill>
+                <a:latin typeface="+mn-lt"/>
+                <a:ea typeface="+mn-ea"/>
+                <a:cs typeface="+mn-cs"/>
+              </a:defRPr>
+            </a:lvl5pPr>
+            <a:lvl6pPr marL="2286000" indent="0" algn="ctr" defTabSz="914400" rtl="0" eaLnBrk="1" latinLnBrk="0" hangingPunct="1">
+              <a:spcBef>
+                <a:spcPct val="20000"/>
+              </a:spcBef>
+              <a:buClr>
+                <a:schemeClr val="accent1"/>
+              </a:buClr>
+              <a:buFont typeface="Arial" pitchFamily="34" charset="0"/>
+              <a:buNone/>
+              <a:defRPr sz="1300" kern="1200">
+                <a:solidFill>
+                  <a:schemeClr val="tx1">
+                    <a:tint val="75000"/>
+                  </a:schemeClr>
+                </a:solidFill>
+                <a:latin typeface="+mn-lt"/>
+                <a:ea typeface="+mn-ea"/>
+                <a:cs typeface="+mn-cs"/>
+              </a:defRPr>
+            </a:lvl6pPr>
+            <a:lvl7pPr marL="2743200" indent="0" algn="ctr" defTabSz="914400" rtl="0" eaLnBrk="1" latinLnBrk="0" hangingPunct="1">
+              <a:spcBef>
+                <a:spcPct val="20000"/>
+              </a:spcBef>
+              <a:buClr>
+                <a:schemeClr val="accent1"/>
+              </a:buClr>
+              <a:buFont typeface="Arial" pitchFamily="34" charset="0"/>
+              <a:buNone/>
+              <a:defRPr sz="1300" kern="1200">
+                <a:solidFill>
+                  <a:schemeClr val="tx1">
+                    <a:tint val="75000"/>
+                  </a:schemeClr>
+                </a:solidFill>
+                <a:latin typeface="+mn-lt"/>
+                <a:ea typeface="+mn-ea"/>
+                <a:cs typeface="+mn-cs"/>
+              </a:defRPr>
+            </a:lvl7pPr>
+            <a:lvl8pPr marL="3200400" indent="0" algn="ctr" defTabSz="914400" rtl="0" eaLnBrk="1" latinLnBrk="0" hangingPunct="1">
+              <a:spcBef>
+                <a:spcPct val="20000"/>
+              </a:spcBef>
+              <a:buClr>
+                <a:schemeClr val="accent1"/>
+              </a:buClr>
+              <a:buFont typeface="Arial" pitchFamily="34" charset="0"/>
+              <a:buNone/>
+              <a:defRPr sz="1300" kern="1200">
+                <a:solidFill>
+                  <a:schemeClr val="tx1">
+                    <a:tint val="75000"/>
+                  </a:schemeClr>
+                </a:solidFill>
+                <a:latin typeface="+mn-lt"/>
+                <a:ea typeface="+mn-ea"/>
+                <a:cs typeface="+mn-cs"/>
+              </a:defRPr>
+            </a:lvl8pPr>
+            <a:lvl9pPr marL="3657600" indent="0" algn="ctr" defTabSz="914400" rtl="0" eaLnBrk="1" latinLnBrk="0" hangingPunct="1">
+              <a:spcBef>
+                <a:spcPct val="20000"/>
+              </a:spcBef>
+              <a:buClr>
+                <a:schemeClr val="accent1"/>
+              </a:buClr>
+              <a:buFont typeface="Arial" pitchFamily="34" charset="0"/>
+              <a:buNone/>
+              <a:defRPr sz="1300" kern="1200">
+                <a:solidFill>
+                  <a:schemeClr val="tx1">
+                    <a:tint val="75000"/>
+                  </a:schemeClr>
+                </a:solidFill>
+                <a:latin typeface="+mn-lt"/>
+                <a:ea typeface="+mn-ea"/>
+                <a:cs typeface="+mn-cs"/>
+              </a:defRPr>
+            </a:lvl9pPr>
+          </a:lstStyle>
+          <a:p>
+            <a:fld id="{B07CD00D-ECE2-B341-910C-3E5E7B4740E6}" type="datetime4">
+              <a:rPr lang="en-US" smtClean="0">
+                <a:latin typeface="Times New Roman"/>
+                <a:cs typeface="Times New Roman"/>
+              </a:rPr>
+              <a:t>September 12, 2014</a:t>
             </a:fld>
             <a:endParaRPr lang="en-US" dirty="0">
               <a:latin typeface="Times New Roman"/>
@@ -1643,9 +1866,9 @@
           <a:bodyPr/>
           <a:lstStyle/>
           <a:p>
-            <a:fld id="{EA699BF9-66CB-F244-8E74-7B1BE1C77046}" type="datetime2">
-              <a:rPr lang="en-US" smtClean="0"/>
-              <a:t>Wednesday, September 10, 14</a:t>
+            <a:fld id="{F0A152E4-32F9-4546-9C15-BF5609F2BEFF}" type="datetime2">
+              <a:rPr lang="en-US" smtClean="0"/>
+              <a:t>Friday, September 12, 14</a:t>
             </a:fld>
             <a:endParaRPr lang="en-US"/>
           </a:p>
@@ -1669,7 +1892,7 @@
             <a:pPr algn="r"/>
             <a:r>
               <a:rPr lang="en-US" smtClean="0"/>
-              <a:t>Sanjay Kalé and PPL (UIUC) – Parallel Migratable Objects </a:t>
+              <a:t>Laxmikant Kalé and PPL (UIUC) – Parallel Migratable Objects </a:t>
             </a:r>
             <a:endParaRPr lang="en-US" dirty="0"/>
           </a:p>
@@ -1954,9 +2177,9 @@
           <a:bodyPr/>
           <a:lstStyle/>
           <a:p>
-            <a:fld id="{D300BE84-9843-8B4F-B3C8-647B06AC46C9}" type="datetime2">
-              <a:rPr lang="en-US" smtClean="0"/>
-              <a:t>Wednesday, September 10, 14</a:t>
+            <a:fld id="{B56FE1C6-3E0C-6949-ADE3-7CF787614FD0}" type="datetime2">
+              <a:rPr lang="en-US" smtClean="0"/>
+              <a:t>Friday, September 12, 14</a:t>
             </a:fld>
             <a:endParaRPr lang="en-US"/>
           </a:p>
@@ -1980,7 +2203,7 @@
             <a:pPr algn="r"/>
             <a:r>
               <a:rPr lang="en-US" smtClean="0"/>
-              <a:t>Sanjay Kalé and PPL (UIUC) – Parallel Migratable Objects </a:t>
+              <a:t>Laxmikant Kalé and PPL (UIUC) – Parallel Migratable Objects </a:t>
             </a:r>
             <a:endParaRPr lang="en-US" dirty="0"/>
           </a:p>
@@ -2125,9 +2348,9 @@
           <a:bodyPr/>
           <a:lstStyle/>
           <a:p>
-            <a:fld id="{C460AE39-2092-A945-8296-F25085B9A0F1}" type="datetime2">
-              <a:rPr lang="en-US" smtClean="0"/>
-              <a:t>Wednesday, September 10, 14</a:t>
+            <a:fld id="{252E3A9B-DAFE-994E-A988-929267522860}" type="datetime2">
+              <a:rPr lang="en-US" smtClean="0"/>
+              <a:t>Friday, September 12, 14</a:t>
             </a:fld>
             <a:endParaRPr lang="en-US"/>
           </a:p>
@@ -2151,7 +2374,7 @@
             <a:pPr algn="r"/>
             <a:r>
               <a:rPr lang="en-US" smtClean="0"/>
-              <a:t>Sanjay Kalé and PPL (UIUC) – Parallel Migratable Objects </a:t>
+              <a:t>Laxmikant Kalé and PPL (UIUC) – Parallel Migratable Objects </a:t>
             </a:r>
             <a:endParaRPr lang="en-US" dirty="0"/>
           </a:p>
@@ -2306,9 +2529,9 @@
           <a:bodyPr/>
           <a:lstStyle/>
           <a:p>
-            <a:fld id="{63BC7E9D-3218-5E49-A867-E087AB2F4618}" type="datetime2">
-              <a:rPr lang="en-US" smtClean="0"/>
-              <a:t>Wednesday, September 10, 14</a:t>
+            <a:fld id="{9183BCBC-5907-4448-873A-3DDC09B4DF44}" type="datetime2">
+              <a:rPr lang="en-US" smtClean="0"/>
+              <a:t>Friday, September 12, 14</a:t>
             </a:fld>
             <a:endParaRPr lang="en-US"/>
           </a:p>
@@ -2332,7 +2555,7 @@
             <a:pPr algn="r"/>
             <a:r>
               <a:rPr lang="en-US" smtClean="0"/>
-              <a:t>Sanjay Kalé and PPL (UIUC) – Parallel Migratable Objects </a:t>
+              <a:t>Laxmikant Kalé and PPL (UIUC) – Parallel Migratable Objects </a:t>
             </a:r>
             <a:endParaRPr lang="en-US" dirty="0"/>
           </a:p>
@@ -2371,7 +2594,7 @@
 </file>
 
 <file path=ppt/slideLayouts/slideLayout14.xml><?xml version="1.0" encoding="utf-8"?>
-<p:sldLayout xmlns:a="http://schemas.openxmlformats.org/drawingml/2006/main" xmlns:r="http://schemas.openxmlformats.org/officeDocument/2006/relationships" xmlns:p="http://schemas.openxmlformats.org/presentationml/2006/main" preserve="1" userDrawn="1">
+<p:sldLayout xmlns:a="http://schemas.openxmlformats.org/drawingml/2006/main" xmlns:r="http://schemas.openxmlformats.org/officeDocument/2006/relationships" xmlns:p="http://schemas.openxmlformats.org/presentationml/2006/main" preserve="1">
   <p:cSld name="1_Title Slide">
     <p:spTree>
       <p:nvGrpSpPr>
@@ -2418,7 +2641,7 @@
           </a:lstStyle>
           <a:p>
             <a:r>
-              <a:rPr lang="en-US" dirty="0" smtClean="0"/>
+              <a:rPr lang="en-US" smtClean="0"/>
               <a:t>Click to edit Master title style</a:t>
             </a:r>
             <a:endParaRPr lang="en-US" dirty="0"/>
@@ -2538,7 +2761,7 @@
           </a:lstStyle>
           <a:p>
             <a:r>
-              <a:rPr lang="en-US" dirty="0" smtClean="0"/>
+              <a:rPr lang="en-US" smtClean="0"/>
               <a:t>Click to edit Master subtitle style</a:t>
             </a:r>
             <a:endParaRPr lang="en-US" dirty="0"/>
@@ -2560,9 +2783,9 @@
           <a:bodyPr/>
           <a:lstStyle/>
           <a:p>
-            <a:fld id="{B594EA25-E4F4-3746-A0BA-A11E27330E0F}" type="datetime2">
-              <a:rPr lang="en-US" smtClean="0"/>
-              <a:t>Wednesday, September 10, 14</a:t>
+            <a:fld id="{59ED30DC-E902-5141-B9E1-1D35C19796E1}" type="datetime2">
+              <a:rPr lang="en-US" smtClean="0"/>
+              <a:t>Friday, September 12, 14</a:t>
             </a:fld>
             <a:endParaRPr lang="en-US"/>
           </a:p>
@@ -2586,7 +2809,7 @@
             <a:pPr algn="r"/>
             <a:r>
               <a:rPr lang="en-US" smtClean="0"/>
-              <a:t>Sanjay Kalé and PPL (UIUC) – Parallel Migratable Objects </a:t>
+              <a:t>Laxmikant Kalé and PPL (UIUC) – Parallel Migratable Objects </a:t>
             </a:r>
             <a:endParaRPr lang="en-US" dirty="0"/>
           </a:p>
@@ -2657,7 +2880,7 @@
           <p:cNvSpPr txBox="1">
             <a:spLocks/>
           </p:cNvSpPr>
-          <p:nvPr userDrawn="1"/>
+          <p:nvPr/>
         </p:nvSpPr>
         <p:spPr>
           <a:xfrm>
@@ -2865,7 +3088,7 @@
                 <a:latin typeface="Times New Roman"/>
                 <a:cs typeface="Times New Roman"/>
               </a:rPr>
-              <a:t>September 10, 2014</a:t>
+              <a:t>September 12, 2014</a:t>
             </a:fld>
             <a:endParaRPr lang="en-US" dirty="0">
               <a:latin typeface="Times New Roman"/>
@@ -2919,10 +3142,232 @@
           <a:p>
             <a:pPr lvl="0"/>
             <a:r>
-              <a:rPr lang="en-US" dirty="0" smtClean="0"/>
+              <a:rPr lang="en-US" smtClean="0"/>
               <a:t>Click to edit Master text styles</a:t>
             </a:r>
-            <a:endParaRPr lang="en-US" dirty="0"/>
+          </a:p>
+        </p:txBody>
+      </p:sp>
+      <p:sp>
+        <p:nvSpPr>
+          <p:cNvPr id="11" name="Subtitle 2"/>
+          <p:cNvSpPr txBox="1">
+            <a:spLocks/>
+          </p:cNvSpPr>
+          <p:nvPr userDrawn="1"/>
+        </p:nvSpPr>
+        <p:spPr>
+          <a:xfrm>
+            <a:off x="1404926" y="4774277"/>
+            <a:ext cx="6400800" cy="700402"/>
+          </a:xfrm>
+          <a:prstGeom prst="rect">
+            <a:avLst/>
+          </a:prstGeom>
+        </p:spPr>
+        <p:txBody>
+          <a:bodyPr vert="horz" lIns="91440" tIns="45720" rIns="91440" bIns="45720" rtlCol="0">
+            <a:normAutofit/>
+          </a:bodyPr>
+          <a:lstStyle>
+            <a:lvl1pPr marL="0" indent="0" algn="ctr" defTabSz="914400" rtl="0" eaLnBrk="1" latinLnBrk="0" hangingPunct="1">
+              <a:spcBef>
+                <a:spcPct val="20000"/>
+              </a:spcBef>
+              <a:buClr>
+                <a:schemeClr val="accent1"/>
+              </a:buClr>
+              <a:buSzPct val="85000"/>
+              <a:buFont typeface="Arial" pitchFamily="34" charset="0"/>
+              <a:buNone/>
+              <a:defRPr sz="2400" kern="1200">
+                <a:solidFill>
+                  <a:schemeClr val="tx1">
+                    <a:lumMod val="75000"/>
+                    <a:lumOff val="25000"/>
+                  </a:schemeClr>
+                </a:solidFill>
+                <a:latin typeface="+mn-lt"/>
+                <a:ea typeface="+mn-ea"/>
+                <a:cs typeface="+mn-cs"/>
+              </a:defRPr>
+            </a:lvl1pPr>
+            <a:lvl2pPr marL="457200" indent="0" algn="ctr" defTabSz="914400" rtl="0" eaLnBrk="1" latinLnBrk="0" hangingPunct="1">
+              <a:spcBef>
+                <a:spcPct val="20000"/>
+              </a:spcBef>
+              <a:buClr>
+                <a:schemeClr val="accent1"/>
+              </a:buClr>
+              <a:buSzPct val="85000"/>
+              <a:buFont typeface="Arial" pitchFamily="34" charset="0"/>
+              <a:buNone/>
+              <a:defRPr sz="2000" kern="1200">
+                <a:solidFill>
+                  <a:schemeClr val="tx1">
+                    <a:tint val="75000"/>
+                  </a:schemeClr>
+                </a:solidFill>
+                <a:latin typeface="+mn-lt"/>
+                <a:ea typeface="+mn-ea"/>
+                <a:cs typeface="+mn-cs"/>
+              </a:defRPr>
+            </a:lvl2pPr>
+            <a:lvl3pPr marL="914400" indent="0" algn="ctr" defTabSz="914400" rtl="0" eaLnBrk="1" latinLnBrk="0" hangingPunct="1">
+              <a:spcBef>
+                <a:spcPct val="20000"/>
+              </a:spcBef>
+              <a:buClr>
+                <a:schemeClr val="accent1"/>
+              </a:buClr>
+              <a:buSzPct val="90000"/>
+              <a:buFont typeface="Arial" pitchFamily="34" charset="0"/>
+              <a:buNone/>
+              <a:defRPr sz="1800" kern="1200">
+                <a:solidFill>
+                  <a:schemeClr val="tx1">
+                    <a:tint val="75000"/>
+                  </a:schemeClr>
+                </a:solidFill>
+                <a:latin typeface="+mn-lt"/>
+                <a:ea typeface="+mn-ea"/>
+                <a:cs typeface="+mn-cs"/>
+              </a:defRPr>
+            </a:lvl3pPr>
+            <a:lvl4pPr marL="1371600" indent="0" algn="ctr" defTabSz="914400" rtl="0" eaLnBrk="1" latinLnBrk="0" hangingPunct="1">
+              <a:spcBef>
+                <a:spcPct val="20000"/>
+              </a:spcBef>
+              <a:buClr>
+                <a:schemeClr val="accent1"/>
+              </a:buClr>
+              <a:buFont typeface="Arial" pitchFamily="34" charset="0"/>
+              <a:buNone/>
+              <a:defRPr sz="1600" kern="1200">
+                <a:solidFill>
+                  <a:schemeClr val="tx1">
+                    <a:tint val="75000"/>
+                  </a:schemeClr>
+                </a:solidFill>
+                <a:latin typeface="+mn-lt"/>
+                <a:ea typeface="+mn-ea"/>
+                <a:cs typeface="+mn-cs"/>
+              </a:defRPr>
+            </a:lvl4pPr>
+            <a:lvl5pPr marL="1828800" indent="0" algn="ctr" defTabSz="914400" rtl="0" eaLnBrk="1" latinLnBrk="0" hangingPunct="1">
+              <a:spcBef>
+                <a:spcPct val="20000"/>
+              </a:spcBef>
+              <a:buClr>
+                <a:schemeClr val="accent1"/>
+              </a:buClr>
+              <a:buSzPct val="100000"/>
+              <a:buFont typeface="Arial" pitchFamily="34" charset="0"/>
+              <a:buNone/>
+              <a:defRPr sz="1400" kern="1200" baseline="0">
+                <a:solidFill>
+                  <a:schemeClr val="tx1">
+                    <a:tint val="75000"/>
+                  </a:schemeClr>
+                </a:solidFill>
+                <a:latin typeface="+mn-lt"/>
+                <a:ea typeface="+mn-ea"/>
+                <a:cs typeface="+mn-cs"/>
+              </a:defRPr>
+            </a:lvl5pPr>
+            <a:lvl6pPr marL="2286000" indent="0" algn="ctr" defTabSz="914400" rtl="0" eaLnBrk="1" latinLnBrk="0" hangingPunct="1">
+              <a:spcBef>
+                <a:spcPct val="20000"/>
+              </a:spcBef>
+              <a:buClr>
+                <a:schemeClr val="accent1"/>
+              </a:buClr>
+              <a:buFont typeface="Arial" pitchFamily="34" charset="0"/>
+              <a:buNone/>
+              <a:defRPr sz="1300" kern="1200">
+                <a:solidFill>
+                  <a:schemeClr val="tx1">
+                    <a:tint val="75000"/>
+                  </a:schemeClr>
+                </a:solidFill>
+                <a:latin typeface="+mn-lt"/>
+                <a:ea typeface="+mn-ea"/>
+                <a:cs typeface="+mn-cs"/>
+              </a:defRPr>
+            </a:lvl6pPr>
+            <a:lvl7pPr marL="2743200" indent="0" algn="ctr" defTabSz="914400" rtl="0" eaLnBrk="1" latinLnBrk="0" hangingPunct="1">
+              <a:spcBef>
+                <a:spcPct val="20000"/>
+              </a:spcBef>
+              <a:buClr>
+                <a:schemeClr val="accent1"/>
+              </a:buClr>
+              <a:buFont typeface="Arial" pitchFamily="34" charset="0"/>
+              <a:buNone/>
+              <a:defRPr sz="1300" kern="1200">
+                <a:solidFill>
+                  <a:schemeClr val="tx1">
+                    <a:tint val="75000"/>
+                  </a:schemeClr>
+                </a:solidFill>
+                <a:latin typeface="+mn-lt"/>
+                <a:ea typeface="+mn-ea"/>
+                <a:cs typeface="+mn-cs"/>
+              </a:defRPr>
+            </a:lvl7pPr>
+            <a:lvl8pPr marL="3200400" indent="0" algn="ctr" defTabSz="914400" rtl="0" eaLnBrk="1" latinLnBrk="0" hangingPunct="1">
+              <a:spcBef>
+                <a:spcPct val="20000"/>
+              </a:spcBef>
+              <a:buClr>
+                <a:schemeClr val="accent1"/>
+              </a:buClr>
+              <a:buFont typeface="Arial" pitchFamily="34" charset="0"/>
+              <a:buNone/>
+              <a:defRPr sz="1300" kern="1200">
+                <a:solidFill>
+                  <a:schemeClr val="tx1">
+                    <a:tint val="75000"/>
+                  </a:schemeClr>
+                </a:solidFill>
+                <a:latin typeface="+mn-lt"/>
+                <a:ea typeface="+mn-ea"/>
+                <a:cs typeface="+mn-cs"/>
+              </a:defRPr>
+            </a:lvl8pPr>
+            <a:lvl9pPr marL="3657600" indent="0" algn="ctr" defTabSz="914400" rtl="0" eaLnBrk="1" latinLnBrk="0" hangingPunct="1">
+              <a:spcBef>
+                <a:spcPct val="20000"/>
+              </a:spcBef>
+              <a:buClr>
+                <a:schemeClr val="accent1"/>
+              </a:buClr>
+              <a:buFont typeface="Arial" pitchFamily="34" charset="0"/>
+              <a:buNone/>
+              <a:defRPr sz="1300" kern="1200">
+                <a:solidFill>
+                  <a:schemeClr val="tx1">
+                    <a:tint val="75000"/>
+                  </a:schemeClr>
+                </a:solidFill>
+                <a:latin typeface="+mn-lt"/>
+                <a:ea typeface="+mn-ea"/>
+                <a:cs typeface="+mn-cs"/>
+              </a:defRPr>
+            </a:lvl9pPr>
+          </a:lstStyle>
+          <a:p>
+            <a:fld id="{B07CD00D-ECE2-B341-910C-3E5E7B4740E6}" type="datetime4">
+              <a:rPr lang="en-US" smtClean="0">
+                <a:latin typeface="Times New Roman"/>
+                <a:cs typeface="Times New Roman"/>
+              </a:rPr>
+              <a:t>September 12, 2014</a:t>
+            </a:fld>
+            <a:endParaRPr lang="en-US" dirty="0">
+              <a:latin typeface="Times New Roman"/>
+              <a:cs typeface="Times New Roman"/>
+            </a:endParaRPr>
           </a:p>
         </p:txBody>
       </p:sp>
@@ -2935,7 +3380,7 @@
 </file>
 
 <file path=ppt/slideLayouts/slideLayout15.xml><?xml version="1.0" encoding="utf-8"?>
-<p:sldLayout xmlns:a="http://schemas.openxmlformats.org/drawingml/2006/main" xmlns:r="http://schemas.openxmlformats.org/officeDocument/2006/relationships" xmlns:p="http://schemas.openxmlformats.org/presentationml/2006/main" preserve="1" userDrawn="1">
+<p:sldLayout xmlns:a="http://schemas.openxmlformats.org/drawingml/2006/main" xmlns:r="http://schemas.openxmlformats.org/officeDocument/2006/relationships" xmlns:p="http://schemas.openxmlformats.org/presentationml/2006/main" preserve="1">
   <p:cSld name="1_Custom Layout">
     <p:spTree>
       <p:nvGrpSpPr>
@@ -2989,9 +3434,9 @@
           <a:bodyPr/>
           <a:lstStyle/>
           <a:p>
-            <a:fld id="{BD5AFB16-13FE-DF4A-8CB7-09756A57B2EA}" type="datetime2">
-              <a:rPr lang="en-US" smtClean="0"/>
-              <a:t>Wednesday, September 10, 14</a:t>
+            <a:fld id="{EFB082D6-DFA6-354E-8E01-57AA34489CC9}" type="datetime2">
+              <a:rPr lang="en-US" smtClean="0"/>
+              <a:t>Friday, September 12, 14</a:t>
             </a:fld>
             <a:endParaRPr lang="en-US" dirty="0"/>
           </a:p>
@@ -3015,7 +3460,7 @@
             <a:pPr algn="r"/>
             <a:r>
               <a:rPr lang="en-US" smtClean="0"/>
-              <a:t>Sanjay Kalé and PPL (UIUC) – Parallel Migratable Objects </a:t>
+              <a:t>Laxmikant Kalé and PPL (UIUC) – Parallel Migratable Objects </a:t>
             </a:r>
             <a:endParaRPr lang="en-US" dirty="0"/>
           </a:p>
@@ -3057,8 +3502,8 @@
         </p:nvSpPr>
         <p:spPr>
           <a:xfrm>
-            <a:off x="457200" y="909977"/>
-            <a:ext cx="8229600" cy="1118512"/>
+            <a:off x="261865" y="909977"/>
+            <a:ext cx="8615360" cy="1118512"/>
           </a:xfrm>
         </p:spPr>
         <p:txBody>
@@ -3067,35 +3512,35 @@
           <a:p>
             <a:pPr lvl="0"/>
             <a:r>
-              <a:rPr lang="en-US" dirty="0" smtClean="0"/>
+              <a:rPr lang="en-US" smtClean="0"/>
               <a:t>Click to edit Master text styles</a:t>
             </a:r>
           </a:p>
           <a:p>
             <a:pPr lvl="1"/>
             <a:r>
-              <a:rPr lang="en-US" dirty="0" smtClean="0"/>
+              <a:rPr lang="en-US" smtClean="0"/>
               <a:t>Second level</a:t>
             </a:r>
           </a:p>
           <a:p>
             <a:pPr lvl="2"/>
             <a:r>
-              <a:rPr lang="en-US" dirty="0" smtClean="0"/>
+              <a:rPr lang="en-US" smtClean="0"/>
               <a:t>Third level</a:t>
             </a:r>
           </a:p>
           <a:p>
             <a:pPr lvl="3"/>
             <a:r>
-              <a:rPr lang="en-US" dirty="0" smtClean="0"/>
+              <a:rPr lang="en-US" smtClean="0"/>
               <a:t>Fourth level</a:t>
             </a:r>
           </a:p>
           <a:p>
             <a:pPr lvl="4"/>
             <a:r>
-              <a:rPr lang="en-US" dirty="0" smtClean="0"/>
+              <a:rPr lang="en-US" smtClean="0"/>
               <a:t>Fifth level</a:t>
             </a:r>
             <a:endParaRPr lang="en-US" dirty="0"/>
@@ -3114,8 +3559,8 @@
         </p:nvSpPr>
         <p:spPr>
           <a:xfrm>
-            <a:off x="457200" y="2198574"/>
-            <a:ext cx="8229600" cy="1119049"/>
+            <a:off x="261865" y="2198574"/>
+            <a:ext cx="8615360" cy="1119049"/>
           </a:xfrm>
         </p:spPr>
         <p:txBody>
@@ -3124,35 +3569,35 @@
           <a:p>
             <a:pPr lvl="0"/>
             <a:r>
-              <a:rPr lang="en-US" dirty="0" smtClean="0"/>
+              <a:rPr lang="en-US" smtClean="0"/>
               <a:t>Click to edit Master text styles</a:t>
             </a:r>
           </a:p>
           <a:p>
             <a:pPr lvl="1"/>
             <a:r>
-              <a:rPr lang="en-US" dirty="0" smtClean="0"/>
+              <a:rPr lang="en-US" smtClean="0"/>
               <a:t>Second level</a:t>
             </a:r>
           </a:p>
           <a:p>
             <a:pPr lvl="2"/>
             <a:r>
-              <a:rPr lang="en-US" dirty="0" smtClean="0"/>
+              <a:rPr lang="en-US" smtClean="0"/>
               <a:t>Third level</a:t>
             </a:r>
           </a:p>
           <a:p>
             <a:pPr lvl="3"/>
             <a:r>
-              <a:rPr lang="en-US" dirty="0" smtClean="0"/>
+              <a:rPr lang="en-US" smtClean="0"/>
               <a:t>Fourth level</a:t>
             </a:r>
           </a:p>
           <a:p>
             <a:pPr lvl="4"/>
             <a:r>
-              <a:rPr lang="en-US" dirty="0" smtClean="0"/>
+              <a:rPr lang="en-US" smtClean="0"/>
               <a:t>Fifth level</a:t>
             </a:r>
             <a:endParaRPr lang="en-US" dirty="0"/>
@@ -3171,8 +3616,8 @@
         </p:nvSpPr>
         <p:spPr>
           <a:xfrm>
-            <a:off x="457200" y="3583427"/>
-            <a:ext cx="8229600" cy="1136650"/>
+            <a:off x="261865" y="3583427"/>
+            <a:ext cx="8615360" cy="1136650"/>
           </a:xfrm>
         </p:spPr>
         <p:txBody>
@@ -3212,7 +3657,7 @@
               <a:rPr lang="en-US" smtClean="0"/>
               <a:t>Fifth level</a:t>
             </a:r>
-            <a:endParaRPr lang="en-US"/>
+            <a:endParaRPr lang="en-US" dirty="0"/>
           </a:p>
         </p:txBody>
       </p:sp>
@@ -3228,8 +3673,8 @@
         </p:nvSpPr>
         <p:spPr>
           <a:xfrm>
-            <a:off x="457200" y="5043465"/>
-            <a:ext cx="8229600" cy="1136791"/>
+            <a:off x="261865" y="5043465"/>
+            <a:ext cx="8615360" cy="1136791"/>
           </a:xfrm>
         </p:spPr>
         <p:txBody>
@@ -3269,7 +3714,7 @@
               <a:rPr lang="en-US" smtClean="0"/>
               <a:t>Fifth level</a:t>
             </a:r>
-            <a:endParaRPr lang="en-US"/>
+            <a:endParaRPr lang="en-US" dirty="0"/>
           </a:p>
         </p:txBody>
       </p:sp>
@@ -3287,7 +3732,7 @@
 </file>
 
 <file path=ppt/slideLayouts/slideLayout16.xml><?xml version="1.0" encoding="utf-8"?>
-<p:sldLayout xmlns:a="http://schemas.openxmlformats.org/drawingml/2006/main" xmlns:r="http://schemas.openxmlformats.org/officeDocument/2006/relationships" xmlns:p="http://schemas.openxmlformats.org/presentationml/2006/main" preserve="1" userDrawn="1">
+<p:sldLayout xmlns:a="http://schemas.openxmlformats.org/drawingml/2006/main" xmlns:r="http://schemas.openxmlformats.org/officeDocument/2006/relationships" xmlns:p="http://schemas.openxmlformats.org/presentationml/2006/main" preserve="1">
   <p:cSld name="2_Two Content">
     <p:spTree>
       <p:nvGrpSpPr>
@@ -3319,7 +3764,7 @@
           <a:lstStyle/>
           <a:p>
             <a:r>
-              <a:rPr lang="en-US" dirty="0" smtClean="0"/>
+              <a:rPr lang="en-US" smtClean="0"/>
               <a:t>Click to edit Master title style</a:t>
             </a:r>
             <a:endParaRPr lang="en-US" dirty="0"/>
@@ -3338,8 +3783,8 @@
         </p:nvSpPr>
         <p:spPr>
           <a:xfrm>
-            <a:off x="457200" y="935846"/>
-            <a:ext cx="4038600" cy="3140187"/>
+            <a:off x="261866" y="935846"/>
+            <a:ext cx="4114800" cy="3140187"/>
           </a:xfrm>
         </p:spPr>
         <p:txBody>
@@ -3376,35 +3821,35 @@
           <a:p>
             <a:pPr lvl="0"/>
             <a:r>
-              <a:rPr lang="en-US" dirty="0" smtClean="0"/>
+              <a:rPr lang="en-US" smtClean="0"/>
               <a:t>Click to edit Master text styles</a:t>
             </a:r>
           </a:p>
           <a:p>
             <a:pPr lvl="1"/>
             <a:r>
-              <a:rPr lang="en-US" dirty="0" smtClean="0"/>
+              <a:rPr lang="en-US" smtClean="0"/>
               <a:t>Second level</a:t>
             </a:r>
           </a:p>
           <a:p>
             <a:pPr lvl="2"/>
             <a:r>
-              <a:rPr lang="en-US" dirty="0" smtClean="0"/>
+              <a:rPr lang="en-US" smtClean="0"/>
               <a:t>Third level</a:t>
             </a:r>
           </a:p>
           <a:p>
             <a:pPr lvl="3"/>
             <a:r>
-              <a:rPr lang="en-US" dirty="0" smtClean="0"/>
+              <a:rPr lang="en-US" smtClean="0"/>
               <a:t>Fourth level</a:t>
             </a:r>
           </a:p>
           <a:p>
             <a:pPr lvl="4"/>
             <a:r>
-              <a:rPr lang="en-US" dirty="0" smtClean="0"/>
+              <a:rPr lang="en-US" smtClean="0"/>
               <a:t>Fifth level</a:t>
             </a:r>
             <a:endParaRPr lang="en-US" dirty="0"/>
@@ -3423,8 +3868,8 @@
         </p:nvSpPr>
         <p:spPr>
           <a:xfrm>
-            <a:off x="4648200" y="935846"/>
-            <a:ext cx="4038600" cy="3140187"/>
+            <a:off x="4737100" y="935846"/>
+            <a:ext cx="4140124" cy="3140187"/>
           </a:xfrm>
         </p:spPr>
         <p:txBody>
@@ -3461,35 +3906,35 @@
           <a:p>
             <a:pPr lvl="0"/>
             <a:r>
-              <a:rPr lang="en-US" dirty="0" smtClean="0"/>
+              <a:rPr lang="en-US" smtClean="0"/>
               <a:t>Click to edit Master text styles</a:t>
             </a:r>
           </a:p>
           <a:p>
             <a:pPr lvl="1"/>
             <a:r>
-              <a:rPr lang="en-US" dirty="0" smtClean="0"/>
+              <a:rPr lang="en-US" smtClean="0"/>
               <a:t>Second level</a:t>
             </a:r>
           </a:p>
           <a:p>
             <a:pPr lvl="2"/>
             <a:r>
-              <a:rPr lang="en-US" dirty="0" smtClean="0"/>
+              <a:rPr lang="en-US" smtClean="0"/>
               <a:t>Third level</a:t>
             </a:r>
           </a:p>
           <a:p>
             <a:pPr lvl="3"/>
             <a:r>
-              <a:rPr lang="en-US" dirty="0" smtClean="0"/>
+              <a:rPr lang="en-US" smtClean="0"/>
               <a:t>Fourth level</a:t>
             </a:r>
           </a:p>
           <a:p>
             <a:pPr lvl="4"/>
             <a:r>
-              <a:rPr lang="en-US" dirty="0" smtClean="0"/>
+              <a:rPr lang="en-US" smtClean="0"/>
               <a:t>Fifth level</a:t>
             </a:r>
             <a:endParaRPr lang="en-US" dirty="0"/>
@@ -3518,9 +3963,9 @@
             </a:lvl1pPr>
           </a:lstStyle>
           <a:p>
-            <a:fld id="{30545249-FD76-6844-B252-CAB05FC2DAA8}" type="datetime2">
-              <a:rPr lang="en-US" smtClean="0"/>
-              <a:t>Wednesday, September 10, 14</a:t>
+            <a:fld id="{0BBD8AA5-66C9-704A-88B6-F5F1B3C387C4}" type="datetime2">
+              <a:rPr lang="en-US" smtClean="0"/>
+              <a:t>Friday, September 12, 14</a:t>
             </a:fld>
             <a:endParaRPr lang="en-US" dirty="0"/>
           </a:p>
@@ -3551,7 +3996,1343 @@
             <a:pPr algn="r"/>
             <a:r>
               <a:rPr lang="en-US" smtClean="0"/>
-              <a:t>Sanjay Kalé and PPL (UIUC) – Parallel Migratable Objects </a:t>
+              <a:t>Laxmikant Kalé and PPL (UIUC) – Parallel Migratable Objects </a:t>
+            </a:r>
+            <a:endParaRPr lang="en-US" dirty="0"/>
+          </a:p>
+        </p:txBody>
+      </p:sp>
+      <p:sp>
+        <p:nvSpPr>
+          <p:cNvPr id="7" name="Slide Number Placeholder 6"/>
+          <p:cNvSpPr>
+            <a:spLocks noGrp="1"/>
+          </p:cNvSpPr>
+          <p:nvPr>
+            <p:ph type="sldNum" sz="quarter" idx="12"/>
+          </p:nvPr>
+        </p:nvSpPr>
+        <p:spPr/>
+        <p:txBody>
+          <a:bodyPr/>
+          <a:lstStyle/>
+          <a:p>
+            <a:fld id="{0CFEC368-1D7A-4F81-ABF6-AE0E36BAF64C}" type="slidenum">
+              <a:rPr lang="en-US" smtClean="0"/>
+              <a:pPr/>
+              <a:t>‹#›</a:t>
+            </a:fld>
+            <a:endParaRPr lang="en-US" dirty="0"/>
+          </a:p>
+        </p:txBody>
+      </p:sp>
+      <p:sp>
+        <p:nvSpPr>
+          <p:cNvPr id="9" name="Content Placeholder 8"/>
+          <p:cNvSpPr>
+            <a:spLocks noGrp="1"/>
+          </p:cNvSpPr>
+          <p:nvPr>
+            <p:ph sz="quarter" idx="13"/>
+          </p:nvPr>
+        </p:nvSpPr>
+        <p:spPr>
+          <a:xfrm>
+            <a:off x="261865" y="4829213"/>
+            <a:ext cx="8615360" cy="1550950"/>
+          </a:xfrm>
+          <a:solidFill>
+            <a:schemeClr val="tx2">
+              <a:lumMod val="20000"/>
+              <a:lumOff val="80000"/>
+            </a:schemeClr>
+          </a:solidFill>
+          <a:ln>
+            <a:solidFill>
+              <a:schemeClr val="tx2"/>
+            </a:solidFill>
+          </a:ln>
+        </p:spPr>
+        <p:txBody>
+          <a:bodyPr/>
+          <a:lstStyle/>
+          <a:p>
+            <a:pPr lvl="0"/>
+            <a:r>
+              <a:rPr lang="en-US" smtClean="0"/>
+              <a:t>Click to edit Master text styles</a:t>
+            </a:r>
+          </a:p>
+          <a:p>
+            <a:pPr lvl="1"/>
+            <a:r>
+              <a:rPr lang="en-US" smtClean="0"/>
+              <a:t>Second level</a:t>
+            </a:r>
+          </a:p>
+          <a:p>
+            <a:pPr lvl="2"/>
+            <a:r>
+              <a:rPr lang="en-US" smtClean="0"/>
+              <a:t>Third level</a:t>
+            </a:r>
+          </a:p>
+          <a:p>
+            <a:pPr lvl="3"/>
+            <a:r>
+              <a:rPr lang="en-US" smtClean="0"/>
+              <a:t>Fourth level</a:t>
+            </a:r>
+          </a:p>
+          <a:p>
+            <a:pPr lvl="4"/>
+            <a:r>
+              <a:rPr lang="en-US" smtClean="0"/>
+              <a:t>Fifth level</a:t>
+            </a:r>
+            <a:endParaRPr lang="en-US" dirty="0"/>
+          </a:p>
+        </p:txBody>
+      </p:sp>
+      <p:sp>
+        <p:nvSpPr>
+          <p:cNvPr id="11" name="Text Placeholder 10"/>
+          <p:cNvSpPr>
+            <a:spLocks noGrp="1"/>
+          </p:cNvSpPr>
+          <p:nvPr>
+            <p:ph type="body" sz="quarter" idx="14"/>
+          </p:nvPr>
+        </p:nvSpPr>
+        <p:spPr>
+          <a:xfrm>
+            <a:off x="261865" y="4238625"/>
+            <a:ext cx="8615359" cy="590550"/>
+          </a:xfrm>
+          <a:solidFill>
+            <a:schemeClr val="tx2">
+              <a:lumMod val="40000"/>
+              <a:lumOff val="60000"/>
+            </a:schemeClr>
+          </a:solidFill>
+          <a:ln>
+            <a:solidFill>
+              <a:schemeClr val="tx2"/>
+            </a:solidFill>
+          </a:ln>
+        </p:spPr>
+        <p:txBody>
+          <a:bodyPr/>
+          <a:lstStyle>
+            <a:lvl1pPr marL="0" indent="0">
+              <a:buNone/>
+              <a:defRPr b="1"/>
+            </a:lvl1pPr>
+          </a:lstStyle>
+          <a:p>
+            <a:pPr lvl="0"/>
+            <a:r>
+              <a:rPr lang="en-US" smtClean="0"/>
+              <a:t>Click to edit Master text styles</a:t>
+            </a:r>
+          </a:p>
+        </p:txBody>
+      </p:sp>
+    </p:spTree>
+    <p:extLst>
+      <p:ext uri="{BB962C8B-B14F-4D97-AF65-F5344CB8AC3E}">
+        <p14:creationId xmlns:p14="http://schemas.microsoft.com/office/powerpoint/2010/main" val="707568992"/>
+      </p:ext>
+    </p:extLst>
+  </p:cSld>
+  <p:clrMapOvr>
+    <a:masterClrMapping/>
+  </p:clrMapOvr>
+</p:sldLayout>
+</file>
+
+<file path=ppt/slideLayouts/slideLayout17.xml><?xml version="1.0" encoding="utf-8"?>
+<p:sldLayout xmlns:a="http://schemas.openxmlformats.org/drawingml/2006/main" xmlns:r="http://schemas.openxmlformats.org/officeDocument/2006/relationships" xmlns:p="http://schemas.openxmlformats.org/presentationml/2006/main" preserve="1" userDrawn="1">
+  <p:cSld name="2_Title Slide">
+    <p:spTree>
+      <p:nvGrpSpPr>
+        <p:cNvPr id="1" name=""/>
+        <p:cNvGrpSpPr/>
+        <p:nvPr/>
+      </p:nvGrpSpPr>
+      <p:grpSpPr>
+        <a:xfrm>
+          <a:off x="0" y="0"/>
+          <a:ext cx="0" cy="0"/>
+          <a:chOff x="0" y="0"/>
+          <a:chExt cx="0" cy="0"/>
+        </a:xfrm>
+      </p:grpSpPr>
+      <p:sp>
+        <p:nvSpPr>
+          <p:cNvPr id="2" name="Title 1"/>
+          <p:cNvSpPr>
+            <a:spLocks noGrp="1"/>
+          </p:cNvSpPr>
+          <p:nvPr>
+            <p:ph type="ctrTitle"/>
+          </p:nvPr>
+        </p:nvSpPr>
+        <p:spPr>
+          <a:xfrm>
+            <a:off x="107103" y="1734127"/>
+            <a:ext cx="8904929" cy="698493"/>
+          </a:xfrm>
+        </p:spPr>
+        <p:txBody>
+          <a:bodyPr anchor="b">
+            <a:normAutofit/>
+          </a:bodyPr>
+          <a:lstStyle>
+            <a:lvl1pPr algn="ctr">
+              <a:defRPr sz="4400" cap="small" baseline="0">
+                <a:solidFill>
+                  <a:schemeClr val="tx2"/>
+                </a:solidFill>
+              </a:defRPr>
+            </a:lvl1pPr>
+          </a:lstStyle>
+          <a:p>
+            <a:r>
+              <a:rPr lang="en-US" dirty="0" smtClean="0"/>
+              <a:t>Click to edit Master title style</a:t>
+            </a:r>
+            <a:endParaRPr lang="en-US" dirty="0"/>
+          </a:p>
+        </p:txBody>
+      </p:sp>
+      <p:sp>
+        <p:nvSpPr>
+          <p:cNvPr id="3" name="Subtitle 2"/>
+          <p:cNvSpPr>
+            <a:spLocks noGrp="1"/>
+          </p:cNvSpPr>
+          <p:nvPr>
+            <p:ph type="subTitle" idx="1"/>
+          </p:nvPr>
+        </p:nvSpPr>
+        <p:spPr>
+          <a:xfrm>
+            <a:off x="1404926" y="2849782"/>
+            <a:ext cx="6400800" cy="700402"/>
+          </a:xfrm>
+        </p:spPr>
+        <p:txBody>
+          <a:bodyPr/>
+          <a:lstStyle>
+            <a:lvl1pPr marL="0" indent="0" algn="ctr">
+              <a:buNone/>
+              <a:defRPr>
+                <a:solidFill>
+                  <a:schemeClr val="tx1">
+                    <a:lumMod val="75000"/>
+                    <a:lumOff val="25000"/>
+                  </a:schemeClr>
+                </a:solidFill>
+              </a:defRPr>
+            </a:lvl1pPr>
+            <a:lvl2pPr marL="457200" indent="0" algn="ctr">
+              <a:buNone/>
+              <a:defRPr>
+                <a:solidFill>
+                  <a:schemeClr val="tx1">
+                    <a:tint val="75000"/>
+                  </a:schemeClr>
+                </a:solidFill>
+              </a:defRPr>
+            </a:lvl2pPr>
+            <a:lvl3pPr marL="914400" indent="0" algn="ctr">
+              <a:buNone/>
+              <a:defRPr>
+                <a:solidFill>
+                  <a:schemeClr val="tx1">
+                    <a:tint val="75000"/>
+                  </a:schemeClr>
+                </a:solidFill>
+              </a:defRPr>
+            </a:lvl3pPr>
+            <a:lvl4pPr marL="1371600" indent="0" algn="ctr">
+              <a:buNone/>
+              <a:defRPr>
+                <a:solidFill>
+                  <a:schemeClr val="tx1">
+                    <a:tint val="75000"/>
+                  </a:schemeClr>
+                </a:solidFill>
+              </a:defRPr>
+            </a:lvl4pPr>
+            <a:lvl5pPr marL="1828800" indent="0" algn="ctr">
+              <a:buNone/>
+              <a:defRPr>
+                <a:solidFill>
+                  <a:schemeClr val="tx1">
+                    <a:tint val="75000"/>
+                  </a:schemeClr>
+                </a:solidFill>
+              </a:defRPr>
+            </a:lvl5pPr>
+            <a:lvl6pPr marL="2286000" indent="0" algn="ctr">
+              <a:buNone/>
+              <a:defRPr>
+                <a:solidFill>
+                  <a:schemeClr val="tx1">
+                    <a:tint val="75000"/>
+                  </a:schemeClr>
+                </a:solidFill>
+              </a:defRPr>
+            </a:lvl6pPr>
+            <a:lvl7pPr marL="2743200" indent="0" algn="ctr">
+              <a:buNone/>
+              <a:defRPr>
+                <a:solidFill>
+                  <a:schemeClr val="tx1">
+                    <a:tint val="75000"/>
+                  </a:schemeClr>
+                </a:solidFill>
+              </a:defRPr>
+            </a:lvl7pPr>
+            <a:lvl8pPr marL="3200400" indent="0" algn="ctr">
+              <a:buNone/>
+              <a:defRPr>
+                <a:solidFill>
+                  <a:schemeClr val="tx1">
+                    <a:tint val="75000"/>
+                  </a:schemeClr>
+                </a:solidFill>
+              </a:defRPr>
+            </a:lvl8pPr>
+            <a:lvl9pPr marL="3657600" indent="0" algn="ctr">
+              <a:buNone/>
+              <a:defRPr>
+                <a:solidFill>
+                  <a:schemeClr val="tx1">
+                    <a:tint val="75000"/>
+                  </a:schemeClr>
+                </a:solidFill>
+              </a:defRPr>
+            </a:lvl9pPr>
+          </a:lstStyle>
+          <a:p>
+            <a:r>
+              <a:rPr lang="en-US" dirty="0" smtClean="0"/>
+              <a:t>Click to edit Master subtitle style</a:t>
+            </a:r>
+            <a:endParaRPr lang="en-US" dirty="0"/>
+          </a:p>
+        </p:txBody>
+      </p:sp>
+      <p:sp>
+        <p:nvSpPr>
+          <p:cNvPr id="4" name="Date Placeholder 3"/>
+          <p:cNvSpPr>
+            <a:spLocks noGrp="1"/>
+          </p:cNvSpPr>
+          <p:nvPr>
+            <p:ph type="dt" sz="half" idx="10"/>
+          </p:nvPr>
+        </p:nvSpPr>
+        <p:spPr/>
+        <p:txBody>
+          <a:bodyPr/>
+          <a:lstStyle/>
+          <a:p>
+            <a:fld id="{23CCB914-A2D4-7F4B-B230-36C8BB32B5CF}" type="datetime2">
+              <a:rPr lang="en-US" smtClean="0"/>
+              <a:t>Friday, September 12, 14</a:t>
+            </a:fld>
+            <a:endParaRPr lang="en-US"/>
+          </a:p>
+        </p:txBody>
+      </p:sp>
+      <p:sp>
+        <p:nvSpPr>
+          <p:cNvPr id="5" name="Footer Placeholder 4"/>
+          <p:cNvSpPr>
+            <a:spLocks noGrp="1"/>
+          </p:cNvSpPr>
+          <p:nvPr>
+            <p:ph type="ftr" sz="quarter" idx="11"/>
+          </p:nvPr>
+        </p:nvSpPr>
+        <p:spPr/>
+        <p:txBody>
+          <a:bodyPr/>
+          <a:lstStyle/>
+          <a:p>
+            <a:pPr algn="r"/>
+            <a:r>
+              <a:rPr lang="en-US" smtClean="0"/>
+              <a:t>Laxmikant Kalé and PPL (UIUC) – Parallel Migratable Objects </a:t>
+            </a:r>
+            <a:endParaRPr lang="en-US" dirty="0"/>
+          </a:p>
+        </p:txBody>
+      </p:sp>
+      <p:sp>
+        <p:nvSpPr>
+          <p:cNvPr id="6" name="Slide Number Placeholder 5"/>
+          <p:cNvSpPr>
+            <a:spLocks noGrp="1"/>
+          </p:cNvSpPr>
+          <p:nvPr>
+            <p:ph type="sldNum" sz="quarter" idx="12"/>
+          </p:nvPr>
+        </p:nvSpPr>
+        <p:spPr/>
+        <p:txBody>
+          <a:bodyPr/>
+          <a:lstStyle/>
+          <a:p>
+            <a:fld id="{0CFEC368-1D7A-4F81-ABF6-AE0E36BAF64C}" type="slidenum">
+              <a:rPr lang="en-US" smtClean="0"/>
+              <a:pPr/>
+              <a:t>‹#›</a:t>
+            </a:fld>
+            <a:endParaRPr lang="en-US"/>
+          </a:p>
+        </p:txBody>
+      </p:sp>
+      <p:cxnSp>
+        <p:nvCxnSpPr>
+          <p:cNvPr id="8" name="Straight Connector 7"/>
+          <p:cNvCxnSpPr/>
+          <p:nvPr/>
+        </p:nvCxnSpPr>
+        <p:spPr>
+          <a:xfrm>
+            <a:off x="685800" y="2444811"/>
+            <a:ext cx="7848600" cy="1588"/>
+          </a:xfrm>
+          <a:prstGeom prst="line">
+            <a:avLst/>
+          </a:prstGeom>
+          <a:ln w="19050">
+            <a:solidFill>
+              <a:schemeClr val="tx2"/>
+            </a:solidFill>
+          </a:ln>
+        </p:spPr>
+        <p:style>
+          <a:lnRef idx="1">
+            <a:schemeClr val="accent1"/>
+          </a:lnRef>
+          <a:fillRef idx="0">
+            <a:schemeClr val="accent1"/>
+          </a:fillRef>
+          <a:effectRef idx="0">
+            <a:schemeClr val="accent1"/>
+          </a:effectRef>
+          <a:fontRef idx="minor">
+            <a:schemeClr val="tx1"/>
+          </a:fontRef>
+        </p:style>
+      </p:cxnSp>
+      <p:sp>
+        <p:nvSpPr>
+          <p:cNvPr id="10" name="Subtitle 2"/>
+          <p:cNvSpPr txBox="1">
+            <a:spLocks/>
+          </p:cNvSpPr>
+          <p:nvPr userDrawn="1"/>
+        </p:nvSpPr>
+        <p:spPr>
+          <a:xfrm>
+            <a:off x="1404926" y="4774277"/>
+            <a:ext cx="6400800" cy="700402"/>
+          </a:xfrm>
+          <a:prstGeom prst="rect">
+            <a:avLst/>
+          </a:prstGeom>
+        </p:spPr>
+        <p:txBody>
+          <a:bodyPr vert="horz" lIns="91440" tIns="45720" rIns="91440" bIns="45720" rtlCol="0">
+            <a:normAutofit/>
+          </a:bodyPr>
+          <a:lstStyle>
+            <a:lvl1pPr marL="0" indent="0" algn="ctr" defTabSz="914400" rtl="0" eaLnBrk="1" latinLnBrk="0" hangingPunct="1">
+              <a:spcBef>
+                <a:spcPct val="20000"/>
+              </a:spcBef>
+              <a:buClr>
+                <a:schemeClr val="accent1"/>
+              </a:buClr>
+              <a:buSzPct val="85000"/>
+              <a:buFont typeface="Arial" pitchFamily="34" charset="0"/>
+              <a:buNone/>
+              <a:defRPr sz="2400" kern="1200">
+                <a:solidFill>
+                  <a:schemeClr val="tx1">
+                    <a:lumMod val="75000"/>
+                    <a:lumOff val="25000"/>
+                  </a:schemeClr>
+                </a:solidFill>
+                <a:latin typeface="+mn-lt"/>
+                <a:ea typeface="+mn-ea"/>
+                <a:cs typeface="+mn-cs"/>
+              </a:defRPr>
+            </a:lvl1pPr>
+            <a:lvl2pPr marL="457200" indent="0" algn="ctr" defTabSz="914400" rtl="0" eaLnBrk="1" latinLnBrk="0" hangingPunct="1">
+              <a:spcBef>
+                <a:spcPct val="20000"/>
+              </a:spcBef>
+              <a:buClr>
+                <a:schemeClr val="accent1"/>
+              </a:buClr>
+              <a:buSzPct val="85000"/>
+              <a:buFont typeface="Arial" pitchFamily="34" charset="0"/>
+              <a:buNone/>
+              <a:defRPr sz="2000" kern="1200">
+                <a:solidFill>
+                  <a:schemeClr val="tx1">
+                    <a:tint val="75000"/>
+                  </a:schemeClr>
+                </a:solidFill>
+                <a:latin typeface="+mn-lt"/>
+                <a:ea typeface="+mn-ea"/>
+                <a:cs typeface="+mn-cs"/>
+              </a:defRPr>
+            </a:lvl2pPr>
+            <a:lvl3pPr marL="914400" indent="0" algn="ctr" defTabSz="914400" rtl="0" eaLnBrk="1" latinLnBrk="0" hangingPunct="1">
+              <a:spcBef>
+                <a:spcPct val="20000"/>
+              </a:spcBef>
+              <a:buClr>
+                <a:schemeClr val="accent1"/>
+              </a:buClr>
+              <a:buSzPct val="90000"/>
+              <a:buFont typeface="Arial" pitchFamily="34" charset="0"/>
+              <a:buNone/>
+              <a:defRPr sz="1800" kern="1200">
+                <a:solidFill>
+                  <a:schemeClr val="tx1">
+                    <a:tint val="75000"/>
+                  </a:schemeClr>
+                </a:solidFill>
+                <a:latin typeface="+mn-lt"/>
+                <a:ea typeface="+mn-ea"/>
+                <a:cs typeface="+mn-cs"/>
+              </a:defRPr>
+            </a:lvl3pPr>
+            <a:lvl4pPr marL="1371600" indent="0" algn="ctr" defTabSz="914400" rtl="0" eaLnBrk="1" latinLnBrk="0" hangingPunct="1">
+              <a:spcBef>
+                <a:spcPct val="20000"/>
+              </a:spcBef>
+              <a:buClr>
+                <a:schemeClr val="accent1"/>
+              </a:buClr>
+              <a:buFont typeface="Arial" pitchFamily="34" charset="0"/>
+              <a:buNone/>
+              <a:defRPr sz="1600" kern="1200">
+                <a:solidFill>
+                  <a:schemeClr val="tx1">
+                    <a:tint val="75000"/>
+                  </a:schemeClr>
+                </a:solidFill>
+                <a:latin typeface="+mn-lt"/>
+                <a:ea typeface="+mn-ea"/>
+                <a:cs typeface="+mn-cs"/>
+              </a:defRPr>
+            </a:lvl4pPr>
+            <a:lvl5pPr marL="1828800" indent="0" algn="ctr" defTabSz="914400" rtl="0" eaLnBrk="1" latinLnBrk="0" hangingPunct="1">
+              <a:spcBef>
+                <a:spcPct val="20000"/>
+              </a:spcBef>
+              <a:buClr>
+                <a:schemeClr val="accent1"/>
+              </a:buClr>
+              <a:buSzPct val="100000"/>
+              <a:buFont typeface="Arial" pitchFamily="34" charset="0"/>
+              <a:buNone/>
+              <a:defRPr sz="1400" kern="1200" baseline="0">
+                <a:solidFill>
+                  <a:schemeClr val="tx1">
+                    <a:tint val="75000"/>
+                  </a:schemeClr>
+                </a:solidFill>
+                <a:latin typeface="+mn-lt"/>
+                <a:ea typeface="+mn-ea"/>
+                <a:cs typeface="+mn-cs"/>
+              </a:defRPr>
+            </a:lvl5pPr>
+            <a:lvl6pPr marL="2286000" indent="0" algn="ctr" defTabSz="914400" rtl="0" eaLnBrk="1" latinLnBrk="0" hangingPunct="1">
+              <a:spcBef>
+                <a:spcPct val="20000"/>
+              </a:spcBef>
+              <a:buClr>
+                <a:schemeClr val="accent1"/>
+              </a:buClr>
+              <a:buFont typeface="Arial" pitchFamily="34" charset="0"/>
+              <a:buNone/>
+              <a:defRPr sz="1300" kern="1200">
+                <a:solidFill>
+                  <a:schemeClr val="tx1">
+                    <a:tint val="75000"/>
+                  </a:schemeClr>
+                </a:solidFill>
+                <a:latin typeface="+mn-lt"/>
+                <a:ea typeface="+mn-ea"/>
+                <a:cs typeface="+mn-cs"/>
+              </a:defRPr>
+            </a:lvl6pPr>
+            <a:lvl7pPr marL="2743200" indent="0" algn="ctr" defTabSz="914400" rtl="0" eaLnBrk="1" latinLnBrk="0" hangingPunct="1">
+              <a:spcBef>
+                <a:spcPct val="20000"/>
+              </a:spcBef>
+              <a:buClr>
+                <a:schemeClr val="accent1"/>
+              </a:buClr>
+              <a:buFont typeface="Arial" pitchFamily="34" charset="0"/>
+              <a:buNone/>
+              <a:defRPr sz="1300" kern="1200">
+                <a:solidFill>
+                  <a:schemeClr val="tx1">
+                    <a:tint val="75000"/>
+                  </a:schemeClr>
+                </a:solidFill>
+                <a:latin typeface="+mn-lt"/>
+                <a:ea typeface="+mn-ea"/>
+                <a:cs typeface="+mn-cs"/>
+              </a:defRPr>
+            </a:lvl7pPr>
+            <a:lvl8pPr marL="3200400" indent="0" algn="ctr" defTabSz="914400" rtl="0" eaLnBrk="1" latinLnBrk="0" hangingPunct="1">
+              <a:spcBef>
+                <a:spcPct val="20000"/>
+              </a:spcBef>
+              <a:buClr>
+                <a:schemeClr val="accent1"/>
+              </a:buClr>
+              <a:buFont typeface="Arial" pitchFamily="34" charset="0"/>
+              <a:buNone/>
+              <a:defRPr sz="1300" kern="1200">
+                <a:solidFill>
+                  <a:schemeClr val="tx1">
+                    <a:tint val="75000"/>
+                  </a:schemeClr>
+                </a:solidFill>
+                <a:latin typeface="+mn-lt"/>
+                <a:ea typeface="+mn-ea"/>
+                <a:cs typeface="+mn-cs"/>
+              </a:defRPr>
+            </a:lvl8pPr>
+            <a:lvl9pPr marL="3657600" indent="0" algn="ctr" defTabSz="914400" rtl="0" eaLnBrk="1" latinLnBrk="0" hangingPunct="1">
+              <a:spcBef>
+                <a:spcPct val="20000"/>
+              </a:spcBef>
+              <a:buClr>
+                <a:schemeClr val="accent1"/>
+              </a:buClr>
+              <a:buFont typeface="Arial" pitchFamily="34" charset="0"/>
+              <a:buNone/>
+              <a:defRPr sz="1300" kern="1200">
+                <a:solidFill>
+                  <a:schemeClr val="tx1">
+                    <a:tint val="75000"/>
+                  </a:schemeClr>
+                </a:solidFill>
+                <a:latin typeface="+mn-lt"/>
+                <a:ea typeface="+mn-ea"/>
+                <a:cs typeface="+mn-cs"/>
+              </a:defRPr>
+            </a:lvl9pPr>
+          </a:lstStyle>
+          <a:p>
+            <a:fld id="{B07CD00D-ECE2-B341-910C-3E5E7B4740E6}" type="datetime4">
+              <a:rPr lang="en-US" smtClean="0">
+                <a:latin typeface="Times New Roman"/>
+                <a:cs typeface="Times New Roman"/>
+              </a:rPr>
+              <a:t>September 12, 2014</a:t>
+            </a:fld>
+            <a:endParaRPr lang="en-US" dirty="0">
+              <a:latin typeface="Times New Roman"/>
+              <a:cs typeface="Times New Roman"/>
+            </a:endParaRPr>
+          </a:p>
+        </p:txBody>
+      </p:sp>
+      <p:sp>
+        <p:nvSpPr>
+          <p:cNvPr id="14" name="Content Placeholder 13"/>
+          <p:cNvSpPr>
+            <a:spLocks noGrp="1"/>
+          </p:cNvSpPr>
+          <p:nvPr>
+            <p:ph sz="quarter" idx="13"/>
+          </p:nvPr>
+        </p:nvSpPr>
+        <p:spPr>
+          <a:xfrm>
+            <a:off x="1404938" y="3700463"/>
+            <a:ext cx="6400800" cy="1073150"/>
+          </a:xfrm>
+        </p:spPr>
+        <p:txBody>
+          <a:bodyPr>
+            <a:normAutofit/>
+          </a:bodyPr>
+          <a:lstStyle>
+            <a:lvl1pPr marL="0" indent="0" algn="ctr">
+              <a:buNone/>
+              <a:defRPr sz="1800"/>
+            </a:lvl1pPr>
+            <a:lvl2pPr marL="274320" indent="0">
+              <a:buNone/>
+              <a:defRPr/>
+            </a:lvl2pPr>
+            <a:lvl3pPr marL="548640" indent="0">
+              <a:buNone/>
+              <a:defRPr/>
+            </a:lvl3pPr>
+            <a:lvl4pPr marL="822960" indent="0">
+              <a:buNone/>
+              <a:defRPr/>
+            </a:lvl4pPr>
+            <a:lvl5pPr marL="1051560" indent="0">
+              <a:buNone/>
+              <a:defRPr/>
+            </a:lvl5pPr>
+          </a:lstStyle>
+          <a:p>
+            <a:pPr lvl="0"/>
+            <a:r>
+              <a:rPr lang="en-US" dirty="0" smtClean="0"/>
+              <a:t>Click to edit Master text styles</a:t>
+            </a:r>
+            <a:endParaRPr lang="en-US" dirty="0"/>
+          </a:p>
+        </p:txBody>
+      </p:sp>
+    </p:spTree>
+  </p:cSld>
+  <p:clrMapOvr>
+    <a:masterClrMapping/>
+  </p:clrMapOvr>
+</p:sldLayout>
+</file>
+
+<file path=ppt/slideLayouts/slideLayout18.xml><?xml version="1.0" encoding="utf-8"?>
+<p:sldLayout xmlns:a="http://schemas.openxmlformats.org/drawingml/2006/main" xmlns:r="http://schemas.openxmlformats.org/officeDocument/2006/relationships" xmlns:p="http://schemas.openxmlformats.org/presentationml/2006/main" preserve="1" userDrawn="1">
+  <p:cSld name="2_Custom Layout">
+    <p:spTree>
+      <p:nvGrpSpPr>
+        <p:cNvPr id="1" name=""/>
+        <p:cNvGrpSpPr/>
+        <p:nvPr/>
+      </p:nvGrpSpPr>
+      <p:grpSpPr>
+        <a:xfrm>
+          <a:off x="0" y="0"/>
+          <a:ext cx="0" cy="0"/>
+          <a:chOff x="0" y="0"/>
+          <a:chExt cx="0" cy="0"/>
+        </a:xfrm>
+      </p:grpSpPr>
+      <p:sp>
+        <p:nvSpPr>
+          <p:cNvPr id="2" name="Title 1"/>
+          <p:cNvSpPr>
+            <a:spLocks noGrp="1"/>
+          </p:cNvSpPr>
+          <p:nvPr>
+            <p:ph type="title"/>
+          </p:nvPr>
+        </p:nvSpPr>
+        <p:spPr/>
+        <p:txBody>
+          <a:bodyPr/>
+          <a:lstStyle/>
+          <a:p>
+            <a:r>
+              <a:rPr lang="en-US" smtClean="0"/>
+              <a:t>Click to edit Master title style</a:t>
+            </a:r>
+            <a:endParaRPr lang="en-US"/>
+          </a:p>
+        </p:txBody>
+      </p:sp>
+      <p:sp>
+        <p:nvSpPr>
+          <p:cNvPr id="3" name="Date Placeholder 2"/>
+          <p:cNvSpPr>
+            <a:spLocks noGrp="1"/>
+          </p:cNvSpPr>
+          <p:nvPr>
+            <p:ph type="dt" sz="half" idx="10"/>
+          </p:nvPr>
+        </p:nvSpPr>
+        <p:spPr/>
+        <p:txBody>
+          <a:bodyPr/>
+          <a:lstStyle/>
+          <a:p>
+            <a:fld id="{7619AD58-97C8-5543-8980-2F4B4EC54B98}" type="datetime2">
+              <a:rPr lang="en-US" smtClean="0"/>
+              <a:t>Friday, September 12, 14</a:t>
+            </a:fld>
+            <a:endParaRPr lang="en-US" dirty="0"/>
+          </a:p>
+        </p:txBody>
+      </p:sp>
+      <p:sp>
+        <p:nvSpPr>
+          <p:cNvPr id="4" name="Footer Placeholder 3"/>
+          <p:cNvSpPr>
+            <a:spLocks noGrp="1"/>
+          </p:cNvSpPr>
+          <p:nvPr>
+            <p:ph type="ftr" sz="quarter" idx="11"/>
+          </p:nvPr>
+        </p:nvSpPr>
+        <p:spPr/>
+        <p:txBody>
+          <a:bodyPr/>
+          <a:lstStyle/>
+          <a:p>
+            <a:pPr algn="r"/>
+            <a:r>
+              <a:rPr lang="en-US" smtClean="0"/>
+              <a:t>Laxmikant Kalé and PPL (UIUC) – Parallel Migratable Objects </a:t>
+            </a:r>
+            <a:endParaRPr lang="en-US" dirty="0"/>
+          </a:p>
+        </p:txBody>
+      </p:sp>
+      <p:sp>
+        <p:nvSpPr>
+          <p:cNvPr id="5" name="Slide Number Placeholder 4"/>
+          <p:cNvSpPr>
+            <a:spLocks noGrp="1"/>
+          </p:cNvSpPr>
+          <p:nvPr>
+            <p:ph type="sldNum" sz="quarter" idx="12"/>
+          </p:nvPr>
+        </p:nvSpPr>
+        <p:spPr/>
+        <p:txBody>
+          <a:bodyPr/>
+          <a:lstStyle/>
+          <a:p>
+            <a:fld id="{0CFEC368-1D7A-4F81-ABF6-AE0E36BAF64C}" type="slidenum">
+              <a:rPr lang="en-US" smtClean="0"/>
+              <a:pPr/>
+              <a:t>‹#›</a:t>
+            </a:fld>
+            <a:endParaRPr lang="en-US" dirty="0"/>
+          </a:p>
+        </p:txBody>
+      </p:sp>
+      <p:sp>
+        <p:nvSpPr>
+          <p:cNvPr id="7" name="Content Placeholder 6"/>
+          <p:cNvSpPr>
+            <a:spLocks noGrp="1"/>
+          </p:cNvSpPr>
+          <p:nvPr>
+            <p:ph sz="quarter" idx="13"/>
+          </p:nvPr>
+        </p:nvSpPr>
+        <p:spPr>
+          <a:xfrm>
+            <a:off x="457200" y="909977"/>
+            <a:ext cx="8229600" cy="1118512"/>
+          </a:xfrm>
+        </p:spPr>
+        <p:txBody>
+          <a:bodyPr/>
+          <a:lstStyle/>
+          <a:p>
+            <a:pPr lvl="0"/>
+            <a:r>
+              <a:rPr lang="en-US" dirty="0" smtClean="0"/>
+              <a:t>Click to edit Master text styles</a:t>
+            </a:r>
+          </a:p>
+          <a:p>
+            <a:pPr lvl="1"/>
+            <a:r>
+              <a:rPr lang="en-US" dirty="0" smtClean="0"/>
+              <a:t>Second level</a:t>
+            </a:r>
+          </a:p>
+          <a:p>
+            <a:pPr lvl="2"/>
+            <a:r>
+              <a:rPr lang="en-US" dirty="0" smtClean="0"/>
+              <a:t>Third level</a:t>
+            </a:r>
+          </a:p>
+          <a:p>
+            <a:pPr lvl="3"/>
+            <a:r>
+              <a:rPr lang="en-US" dirty="0" smtClean="0"/>
+              <a:t>Fourth level</a:t>
+            </a:r>
+          </a:p>
+          <a:p>
+            <a:pPr lvl="4"/>
+            <a:r>
+              <a:rPr lang="en-US" dirty="0" smtClean="0"/>
+              <a:t>Fifth level</a:t>
+            </a:r>
+            <a:endParaRPr lang="en-US" dirty="0"/>
+          </a:p>
+        </p:txBody>
+      </p:sp>
+      <p:sp>
+        <p:nvSpPr>
+          <p:cNvPr id="9" name="Content Placeholder 8"/>
+          <p:cNvSpPr>
+            <a:spLocks noGrp="1"/>
+          </p:cNvSpPr>
+          <p:nvPr>
+            <p:ph sz="quarter" idx="14"/>
+          </p:nvPr>
+        </p:nvSpPr>
+        <p:spPr>
+          <a:xfrm>
+            <a:off x="457200" y="2198574"/>
+            <a:ext cx="8229600" cy="1119049"/>
+          </a:xfrm>
+        </p:spPr>
+        <p:txBody>
+          <a:bodyPr/>
+          <a:lstStyle/>
+          <a:p>
+            <a:pPr lvl="0"/>
+            <a:r>
+              <a:rPr lang="en-US" dirty="0" smtClean="0"/>
+              <a:t>Click to edit Master text styles</a:t>
+            </a:r>
+          </a:p>
+          <a:p>
+            <a:pPr lvl="1"/>
+            <a:r>
+              <a:rPr lang="en-US" dirty="0" smtClean="0"/>
+              <a:t>Second level</a:t>
+            </a:r>
+          </a:p>
+          <a:p>
+            <a:pPr lvl="2"/>
+            <a:r>
+              <a:rPr lang="en-US" dirty="0" smtClean="0"/>
+              <a:t>Third level</a:t>
+            </a:r>
+          </a:p>
+          <a:p>
+            <a:pPr lvl="3"/>
+            <a:r>
+              <a:rPr lang="en-US" dirty="0" smtClean="0"/>
+              <a:t>Fourth level</a:t>
+            </a:r>
+          </a:p>
+          <a:p>
+            <a:pPr lvl="4"/>
+            <a:r>
+              <a:rPr lang="en-US" dirty="0" smtClean="0"/>
+              <a:t>Fifth level</a:t>
+            </a:r>
+            <a:endParaRPr lang="en-US" dirty="0"/>
+          </a:p>
+        </p:txBody>
+      </p:sp>
+      <p:sp>
+        <p:nvSpPr>
+          <p:cNvPr id="11" name="Content Placeholder 10"/>
+          <p:cNvSpPr>
+            <a:spLocks noGrp="1"/>
+          </p:cNvSpPr>
+          <p:nvPr>
+            <p:ph sz="quarter" idx="15"/>
+          </p:nvPr>
+        </p:nvSpPr>
+        <p:spPr>
+          <a:xfrm>
+            <a:off x="457200" y="3583427"/>
+            <a:ext cx="8229600" cy="1136650"/>
+          </a:xfrm>
+        </p:spPr>
+        <p:txBody>
+          <a:bodyPr/>
+          <a:lstStyle/>
+          <a:p>
+            <a:pPr lvl="0"/>
+            <a:r>
+              <a:rPr lang="en-US" smtClean="0"/>
+              <a:t>Click to edit Master text styles</a:t>
+            </a:r>
+          </a:p>
+          <a:p>
+            <a:pPr lvl="1"/>
+            <a:r>
+              <a:rPr lang="en-US" smtClean="0"/>
+              <a:t>Second level</a:t>
+            </a:r>
+          </a:p>
+          <a:p>
+            <a:pPr lvl="2"/>
+            <a:r>
+              <a:rPr lang="en-US" smtClean="0"/>
+              <a:t>Third level</a:t>
+            </a:r>
+          </a:p>
+          <a:p>
+            <a:pPr lvl="3"/>
+            <a:r>
+              <a:rPr lang="en-US" smtClean="0"/>
+              <a:t>Fourth level</a:t>
+            </a:r>
+          </a:p>
+          <a:p>
+            <a:pPr lvl="4"/>
+            <a:r>
+              <a:rPr lang="en-US" smtClean="0"/>
+              <a:t>Fifth level</a:t>
+            </a:r>
+            <a:endParaRPr lang="en-US"/>
+          </a:p>
+        </p:txBody>
+      </p:sp>
+      <p:sp>
+        <p:nvSpPr>
+          <p:cNvPr id="13" name="Content Placeholder 12"/>
+          <p:cNvSpPr>
+            <a:spLocks noGrp="1"/>
+          </p:cNvSpPr>
+          <p:nvPr>
+            <p:ph sz="quarter" idx="16"/>
+          </p:nvPr>
+        </p:nvSpPr>
+        <p:spPr>
+          <a:xfrm>
+            <a:off x="457200" y="5043465"/>
+            <a:ext cx="8229600" cy="1136791"/>
+          </a:xfrm>
+        </p:spPr>
+        <p:txBody>
+          <a:bodyPr/>
+          <a:lstStyle/>
+          <a:p>
+            <a:pPr lvl="0"/>
+            <a:r>
+              <a:rPr lang="en-US" smtClean="0"/>
+              <a:t>Click to edit Master text styles</a:t>
+            </a:r>
+          </a:p>
+          <a:p>
+            <a:pPr lvl="1"/>
+            <a:r>
+              <a:rPr lang="en-US" smtClean="0"/>
+              <a:t>Second level</a:t>
+            </a:r>
+          </a:p>
+          <a:p>
+            <a:pPr lvl="2"/>
+            <a:r>
+              <a:rPr lang="en-US" smtClean="0"/>
+              <a:t>Third level</a:t>
+            </a:r>
+          </a:p>
+          <a:p>
+            <a:pPr lvl="3"/>
+            <a:r>
+              <a:rPr lang="en-US" smtClean="0"/>
+              <a:t>Fourth level</a:t>
+            </a:r>
+          </a:p>
+          <a:p>
+            <a:pPr lvl="4"/>
+            <a:r>
+              <a:rPr lang="en-US" smtClean="0"/>
+              <a:t>Fifth level</a:t>
+            </a:r>
+            <a:endParaRPr lang="en-US"/>
+          </a:p>
+        </p:txBody>
+      </p:sp>
+    </p:spTree>
+    <p:extLst>
+      <p:ext uri="{BB962C8B-B14F-4D97-AF65-F5344CB8AC3E}">
+        <p14:creationId xmlns:p14="http://schemas.microsoft.com/office/powerpoint/2010/main" val="596550497"/>
+      </p:ext>
+    </p:extLst>
+  </p:cSld>
+  <p:clrMapOvr>
+    <a:masterClrMapping/>
+  </p:clrMapOvr>
+</p:sldLayout>
+</file>
+
+<file path=ppt/slideLayouts/slideLayout19.xml><?xml version="1.0" encoding="utf-8"?>
+<p:sldLayout xmlns:a="http://schemas.openxmlformats.org/drawingml/2006/main" xmlns:r="http://schemas.openxmlformats.org/officeDocument/2006/relationships" xmlns:p="http://schemas.openxmlformats.org/presentationml/2006/main" preserve="1" userDrawn="1">
+  <p:cSld name="3_Two Content">
+    <p:spTree>
+      <p:nvGrpSpPr>
+        <p:cNvPr id="1" name=""/>
+        <p:cNvGrpSpPr/>
+        <p:nvPr/>
+      </p:nvGrpSpPr>
+      <p:grpSpPr>
+        <a:xfrm>
+          <a:off x="0" y="0"/>
+          <a:ext cx="0" cy="0"/>
+          <a:chOff x="0" y="0"/>
+          <a:chExt cx="0" cy="0"/>
+        </a:xfrm>
+      </p:grpSpPr>
+      <p:sp>
+        <p:nvSpPr>
+          <p:cNvPr id="2" name="Title 1"/>
+          <p:cNvSpPr>
+            <a:spLocks noGrp="1"/>
+          </p:cNvSpPr>
+          <p:nvPr>
+            <p:ph type="title"/>
+          </p:nvPr>
+        </p:nvSpPr>
+        <p:spPr/>
+        <p:txBody>
+          <a:bodyPr/>
+          <a:lstStyle/>
+          <a:p>
+            <a:r>
+              <a:rPr lang="en-US" dirty="0" smtClean="0"/>
+              <a:t>Click to edit Master title style</a:t>
+            </a:r>
+            <a:endParaRPr lang="en-US" dirty="0"/>
+          </a:p>
+        </p:txBody>
+      </p:sp>
+      <p:sp>
+        <p:nvSpPr>
+          <p:cNvPr id="3" name="Content Placeholder 2"/>
+          <p:cNvSpPr>
+            <a:spLocks noGrp="1"/>
+          </p:cNvSpPr>
+          <p:nvPr>
+            <p:ph sz="half" idx="1"/>
+          </p:nvPr>
+        </p:nvSpPr>
+        <p:spPr>
+          <a:xfrm>
+            <a:off x="457200" y="935846"/>
+            <a:ext cx="4038600" cy="3140187"/>
+          </a:xfrm>
+        </p:spPr>
+        <p:txBody>
+          <a:bodyPr/>
+          <a:lstStyle>
+            <a:lvl1pPr>
+              <a:defRPr sz="2800"/>
+            </a:lvl1pPr>
+            <a:lvl2pPr>
+              <a:defRPr sz="2400"/>
+            </a:lvl2pPr>
+            <a:lvl3pPr>
+              <a:defRPr sz="2000"/>
+            </a:lvl3pPr>
+            <a:lvl4pPr>
+              <a:defRPr sz="1800"/>
+            </a:lvl4pPr>
+            <a:lvl5pPr>
+              <a:defRPr sz="1800"/>
+            </a:lvl5pPr>
+            <a:lvl6pPr>
+              <a:defRPr sz="1800"/>
+            </a:lvl6pPr>
+            <a:lvl7pPr>
+              <a:defRPr sz="1800"/>
+            </a:lvl7pPr>
+            <a:lvl8pPr>
+              <a:defRPr sz="1800"/>
+            </a:lvl8pPr>
+            <a:lvl9pPr>
+              <a:defRPr sz="1800"/>
+            </a:lvl9pPr>
+          </a:lstStyle>
+          <a:p>
+            <a:pPr lvl="0"/>
+            <a:r>
+              <a:rPr lang="en-US" dirty="0" smtClean="0"/>
+              <a:t>Click to edit Master text styles</a:t>
+            </a:r>
+          </a:p>
+          <a:p>
+            <a:pPr lvl="1"/>
+            <a:r>
+              <a:rPr lang="en-US" dirty="0" smtClean="0"/>
+              <a:t>Second level</a:t>
+            </a:r>
+          </a:p>
+          <a:p>
+            <a:pPr lvl="2"/>
+            <a:r>
+              <a:rPr lang="en-US" dirty="0" smtClean="0"/>
+              <a:t>Third level</a:t>
+            </a:r>
+          </a:p>
+          <a:p>
+            <a:pPr lvl="3"/>
+            <a:r>
+              <a:rPr lang="en-US" dirty="0" smtClean="0"/>
+              <a:t>Fourth level</a:t>
+            </a:r>
+          </a:p>
+          <a:p>
+            <a:pPr lvl="4"/>
+            <a:r>
+              <a:rPr lang="en-US" dirty="0" smtClean="0"/>
+              <a:t>Fifth level</a:t>
+            </a:r>
+            <a:endParaRPr lang="en-US" dirty="0"/>
+          </a:p>
+        </p:txBody>
+      </p:sp>
+      <p:sp>
+        <p:nvSpPr>
+          <p:cNvPr id="4" name="Content Placeholder 3"/>
+          <p:cNvSpPr>
+            <a:spLocks noGrp="1"/>
+          </p:cNvSpPr>
+          <p:nvPr>
+            <p:ph sz="half" idx="2"/>
+          </p:nvPr>
+        </p:nvSpPr>
+        <p:spPr>
+          <a:xfrm>
+            <a:off x="4648200" y="935846"/>
+            <a:ext cx="4038600" cy="3140187"/>
+          </a:xfrm>
+        </p:spPr>
+        <p:txBody>
+          <a:bodyPr/>
+          <a:lstStyle>
+            <a:lvl1pPr>
+              <a:defRPr sz="2800"/>
+            </a:lvl1pPr>
+            <a:lvl2pPr>
+              <a:defRPr sz="2400"/>
+            </a:lvl2pPr>
+            <a:lvl3pPr>
+              <a:defRPr sz="2000"/>
+            </a:lvl3pPr>
+            <a:lvl4pPr>
+              <a:defRPr sz="1800"/>
+            </a:lvl4pPr>
+            <a:lvl5pPr>
+              <a:defRPr sz="1800"/>
+            </a:lvl5pPr>
+            <a:lvl6pPr>
+              <a:defRPr sz="1800"/>
+            </a:lvl6pPr>
+            <a:lvl7pPr>
+              <a:defRPr sz="1800"/>
+            </a:lvl7pPr>
+            <a:lvl8pPr>
+              <a:defRPr sz="1800"/>
+            </a:lvl8pPr>
+            <a:lvl9pPr>
+              <a:defRPr sz="1800"/>
+            </a:lvl9pPr>
+          </a:lstStyle>
+          <a:p>
+            <a:pPr lvl="0"/>
+            <a:r>
+              <a:rPr lang="en-US" dirty="0" smtClean="0"/>
+              <a:t>Click to edit Master text styles</a:t>
+            </a:r>
+          </a:p>
+          <a:p>
+            <a:pPr lvl="1"/>
+            <a:r>
+              <a:rPr lang="en-US" dirty="0" smtClean="0"/>
+              <a:t>Second level</a:t>
+            </a:r>
+          </a:p>
+          <a:p>
+            <a:pPr lvl="2"/>
+            <a:r>
+              <a:rPr lang="en-US" dirty="0" smtClean="0"/>
+              <a:t>Third level</a:t>
+            </a:r>
+          </a:p>
+          <a:p>
+            <a:pPr lvl="3"/>
+            <a:r>
+              <a:rPr lang="en-US" dirty="0" smtClean="0"/>
+              <a:t>Fourth level</a:t>
+            </a:r>
+          </a:p>
+          <a:p>
+            <a:pPr lvl="4"/>
+            <a:r>
+              <a:rPr lang="en-US" dirty="0" smtClean="0"/>
+              <a:t>Fifth level</a:t>
+            </a:r>
+            <a:endParaRPr lang="en-US" dirty="0"/>
+          </a:p>
+        </p:txBody>
+      </p:sp>
+      <p:sp>
+        <p:nvSpPr>
+          <p:cNvPr id="5" name="Date Placeholder 4"/>
+          <p:cNvSpPr>
+            <a:spLocks noGrp="1"/>
+          </p:cNvSpPr>
+          <p:nvPr>
+            <p:ph type="dt" sz="half" idx="10"/>
+          </p:nvPr>
+        </p:nvSpPr>
+        <p:spPr/>
+        <p:txBody>
+          <a:bodyPr/>
+          <a:lstStyle>
+            <a:lvl1pPr>
+              <a:defRPr>
+                <a:latin typeface="Times New Roman"/>
+                <a:cs typeface="Times New Roman"/>
+              </a:defRPr>
+            </a:lvl1pPr>
+          </a:lstStyle>
+          <a:p>
+            <a:fld id="{C8BEFB79-43D4-F843-B627-86B5BAA30CA6}" type="datetime2">
+              <a:rPr lang="en-US" smtClean="0"/>
+              <a:t>Friday, September 12, 14</a:t>
+            </a:fld>
+            <a:endParaRPr lang="en-US" dirty="0"/>
+          </a:p>
+        </p:txBody>
+      </p:sp>
+      <p:sp>
+        <p:nvSpPr>
+          <p:cNvPr id="6" name="Footer Placeholder 5"/>
+          <p:cNvSpPr>
+            <a:spLocks noGrp="1"/>
+          </p:cNvSpPr>
+          <p:nvPr>
+            <p:ph type="ftr" sz="quarter" idx="11"/>
+          </p:nvPr>
+        </p:nvSpPr>
+        <p:spPr/>
+        <p:txBody>
+          <a:bodyPr/>
+          <a:lstStyle>
+            <a:lvl1pPr>
+              <a:defRPr>
+                <a:latin typeface="Times New Roman"/>
+                <a:cs typeface="Times New Roman"/>
+              </a:defRPr>
+            </a:lvl1pPr>
+          </a:lstStyle>
+          <a:p>
+            <a:pPr algn="r"/>
+            <a:r>
+              <a:rPr lang="en-US" smtClean="0"/>
+              <a:t>Laxmikant Kalé and PPL (UIUC) – Parallel Migratable Objects </a:t>
             </a:r>
             <a:endParaRPr lang="en-US" dirty="0"/>
           </a:p>
@@ -3814,9 +5595,9 @@
           <a:bodyPr/>
           <a:lstStyle/>
           <a:p>
-            <a:fld id="{34621E95-60A9-FF44-9869-513D9D7A859F}" type="datetime2">
-              <a:rPr lang="en-US" smtClean="0"/>
-              <a:t>Wednesday, September 10, 14</a:t>
+            <a:fld id="{C94FA05A-A646-C047-9E42-F21E71804449}" type="datetime2">
+              <a:rPr lang="en-US" smtClean="0"/>
+              <a:t>Friday, September 12, 14</a:t>
             </a:fld>
             <a:endParaRPr lang="en-US"/>
           </a:p>
@@ -3840,7 +5621,7 @@
             <a:pPr algn="r"/>
             <a:r>
               <a:rPr lang="en-US" smtClean="0"/>
-              <a:t>Sanjay Kalé and PPL (UIUC) – Parallel Migratable Objects </a:t>
+              <a:t>Laxmikant Kalé and PPL (UIUC) – Parallel Migratable Objects </a:t>
             </a:r>
             <a:endParaRPr lang="en-US" dirty="0"/>
           </a:p>
@@ -3933,9 +5714,9 @@
           <a:bodyPr/>
           <a:lstStyle/>
           <a:p>
-            <a:fld id="{BD5AFB16-13FE-DF4A-8CB7-09756A57B2EA}" type="datetime2">
-              <a:rPr lang="en-US" smtClean="0"/>
-              <a:t>Wednesday, September 10, 14</a:t>
+            <a:fld id="{94ABA898-3F0D-0249-B9AE-E17E4EEDD066}" type="datetime2">
+              <a:rPr lang="en-US" smtClean="0"/>
+              <a:t>Friday, September 12, 14</a:t>
             </a:fld>
             <a:endParaRPr lang="en-US" dirty="0"/>
           </a:p>
@@ -3959,7 +5740,7 @@
             <a:pPr algn="r"/>
             <a:r>
               <a:rPr lang="en-US" smtClean="0"/>
-              <a:t>Sanjay Kalé and PPL (UIUC) – Parallel Migratable Objects </a:t>
+              <a:t>Laxmikant Kalé and PPL (UIUC) – Parallel Migratable Objects </a:t>
             </a:r>
             <a:endParaRPr lang="en-US" dirty="0"/>
           </a:p>
@@ -4420,9 +6201,9 @@
           <a:bodyPr/>
           <a:lstStyle/>
           <a:p>
-            <a:fld id="{1BDEC705-8EA9-6C46-8E3B-2CAC7E2C0F7D}" type="datetime2">
-              <a:rPr lang="en-US" smtClean="0"/>
-              <a:t>Wednesday, September 10, 14</a:t>
+            <a:fld id="{FA46681B-8DC4-4643-940D-3A4E4BD92F3F}" type="datetime2">
+              <a:rPr lang="en-US" smtClean="0"/>
+              <a:t>Friday, September 12, 14</a:t>
             </a:fld>
             <a:endParaRPr lang="en-US"/>
           </a:p>
@@ -4446,7 +6227,7 @@
             <a:pPr algn="r"/>
             <a:r>
               <a:rPr lang="en-US" smtClean="0"/>
-              <a:t>Sanjay Kalé and PPL (UIUC) – Parallel Migratable Objects </a:t>
+              <a:t>Laxmikant Kalé and PPL (UIUC) – Parallel Migratable Objects </a:t>
             </a:r>
             <a:endParaRPr lang="en-US" dirty="0"/>
           </a:p>
@@ -4751,9 +6532,9 @@
             </a:lvl1pPr>
           </a:lstStyle>
           <a:p>
-            <a:fld id="{BF613BD3-C5FD-9543-B738-679BF38D8C83}" type="datetime2">
-              <a:rPr lang="en-US" smtClean="0"/>
-              <a:t>Wednesday, September 10, 14</a:t>
+            <a:fld id="{34CC2202-E828-0E49-9E4A-9C01A549A1E0}" type="datetime2">
+              <a:rPr lang="en-US" smtClean="0"/>
+              <a:t>Friday, September 12, 14</a:t>
             </a:fld>
             <a:endParaRPr lang="en-US" dirty="0"/>
           </a:p>
@@ -4784,7 +6565,7 @@
             <a:pPr algn="r"/>
             <a:r>
               <a:rPr lang="en-US" smtClean="0"/>
-              <a:t>Sanjay Kalé and PPL (UIUC) – Parallel Migratable Objects </a:t>
+              <a:t>Laxmikant Kalé and PPL (UIUC) – Parallel Migratable Objects </a:t>
             </a:r>
             <a:endParaRPr lang="en-US" dirty="0"/>
           </a:p>
@@ -5230,9 +7011,9 @@
           <a:bodyPr/>
           <a:lstStyle/>
           <a:p>
-            <a:fld id="{4B5E4F0C-9A9C-5448-99FD-D30288B385C9}" type="datetime2">
-              <a:rPr lang="en-US" smtClean="0"/>
-              <a:t>Wednesday, September 10, 14</a:t>
+            <a:fld id="{A6EA3A8F-8D9B-8A47-95C9-7995BAC45FBF}" type="datetime2">
+              <a:rPr lang="en-US" smtClean="0"/>
+              <a:t>Friday, September 12, 14</a:t>
             </a:fld>
             <a:endParaRPr lang="en-US"/>
           </a:p>
@@ -5256,7 +7037,7 @@
             <a:pPr algn="r"/>
             <a:r>
               <a:rPr lang="en-US" smtClean="0"/>
-              <a:t>Sanjay Kalé and PPL (UIUC) – Parallel Migratable Objects </a:t>
+              <a:t>Laxmikant Kalé and PPL (UIUC) – Parallel Migratable Objects </a:t>
             </a:r>
             <a:endParaRPr lang="en-US" dirty="0"/>
           </a:p>
@@ -5526,9 +7307,9 @@
             </a:lvl1pPr>
           </a:lstStyle>
           <a:p>
-            <a:fld id="{30545249-FD76-6844-B252-CAB05FC2DAA8}" type="datetime2">
-              <a:rPr lang="en-US" smtClean="0"/>
-              <a:t>Wednesday, September 10, 14</a:t>
+            <a:fld id="{CFDEB2E7-57A4-234B-9CFF-1F183E3F5D73}" type="datetime2">
+              <a:rPr lang="en-US" smtClean="0"/>
+              <a:t>Friday, September 12, 14</a:t>
             </a:fld>
             <a:endParaRPr lang="en-US" dirty="0"/>
           </a:p>
@@ -5559,7 +7340,7 @@
             <a:pPr algn="r"/>
             <a:r>
               <a:rPr lang="en-US" smtClean="0"/>
-              <a:t>Sanjay Kalé and PPL (UIUC) – Parallel Migratable Objects </a:t>
+              <a:t>Laxmikant Kalé and PPL (UIUC) – Parallel Migratable Objects </a:t>
             </a:r>
             <a:endParaRPr lang="en-US" dirty="0"/>
           </a:p>
@@ -5769,9 +7550,9 @@
           <a:bodyPr/>
           <a:lstStyle/>
           <a:p>
-            <a:fld id="{CC859171-EEDD-0B48-A5C0-E7218AE20EA7}" type="datetime2">
-              <a:rPr lang="en-US" smtClean="0"/>
-              <a:t>Wednesday, September 10, 14</a:t>
+            <a:fld id="{115C7BD9-ED9E-704A-B712-0697507D34CB}" type="datetime2">
+              <a:rPr lang="en-US" smtClean="0"/>
+              <a:t>Friday, September 12, 14</a:t>
             </a:fld>
             <a:endParaRPr lang="en-US"/>
           </a:p>
@@ -5795,7 +7576,7 @@
             <a:pPr algn="r"/>
             <a:r>
               <a:rPr lang="en-US" smtClean="0"/>
-              <a:t>Sanjay Kalé and PPL (UIUC) – Parallel Migratable Objects </a:t>
+              <a:t>Laxmikant Kalé and PPL (UIUC) – Parallel Migratable Objects </a:t>
             </a:r>
             <a:endParaRPr lang="en-US" dirty="0"/>
           </a:p>
@@ -5865,9 +7646,9 @@
           <a:bodyPr/>
           <a:lstStyle/>
           <a:p>
-            <a:fld id="{C32F9216-0342-7440-9504-BD6C1382BF27}" type="datetime2">
-              <a:rPr lang="en-US" smtClean="0"/>
-              <a:t>Wednesday, September 10, 14</a:t>
+            <a:fld id="{C573A39A-5B53-5849-9763-2A025C30296E}" type="datetime2">
+              <a:rPr lang="en-US" smtClean="0"/>
+              <a:t>Friday, September 12, 14</a:t>
             </a:fld>
             <a:endParaRPr lang="en-US"/>
           </a:p>
@@ -5891,7 +7672,7 @@
             <a:pPr algn="r"/>
             <a:r>
               <a:rPr lang="en-US" smtClean="0"/>
-              <a:t>Sanjay Kalé and PPL (UIUC) – Parallel Migratable Objects </a:t>
+              <a:t>Laxmikant Kalé and PPL (UIUC) – Parallel Migratable Objects </a:t>
             </a:r>
             <a:endParaRPr lang="en-US" dirty="0"/>
           </a:p>
@@ -6040,7 +7821,7 @@
           <a:p>
             <a:r>
               <a:rPr lang="en-US" smtClean="0"/>
-              <a:t>Sanjay Kalé and PPL (UIUC) – Parallel Migratable Objects </a:t>
+              <a:t>Laxmikant Kalé and PPL (UIUC) – Parallel Migratable Objects </a:t>
             </a:r>
             <a:endParaRPr lang="en-US" dirty="0"/>
           </a:p>
@@ -6180,9 +7961,9 @@
             </a:lvl1pPr>
           </a:lstStyle>
           <a:p>
-            <a:fld id="{D36DC8F2-AD63-E841-8C23-5DC3A41041BE}" type="datetime2">
-              <a:rPr lang="en-US" smtClean="0"/>
-              <a:t>Wednesday, September 10, 14</a:t>
+            <a:fld id="{C845D6B7-6A28-554B-92F8-A13C2D0C3061}" type="datetime2">
+              <a:rPr lang="en-US" smtClean="0"/>
+              <a:t>Friday, September 12, 14</a:t>
             </a:fld>
             <a:endParaRPr lang="en-US" dirty="0"/>
           </a:p>
@@ -6234,24 +8015,27 @@
   </p:cSld>
   <p:clrMap bg1="lt1" tx1="dk1" bg2="lt2" tx2="dk2" accent1="accent1" accent2="accent2" accent3="accent3" accent4="accent4" accent5="accent5" accent6="accent6" hlink="hlink" folHlink="folHlink"/>
   <p:sldLayoutIdLst>
-    <p:sldLayoutId id="2147483989" r:id="rId1"/>
-    <p:sldLayoutId id="2147483990" r:id="rId2"/>
-    <p:sldLayoutId id="2147483991" r:id="rId3"/>
-    <p:sldLayoutId id="2147483992" r:id="rId4"/>
-    <p:sldLayoutId id="2147483993" r:id="rId5"/>
-    <p:sldLayoutId id="2147483994" r:id="rId6"/>
-    <p:sldLayoutId id="2147483995" r:id="rId7"/>
-    <p:sldLayoutId id="2147483996" r:id="rId8"/>
-    <p:sldLayoutId id="2147483997" r:id="rId9"/>
-    <p:sldLayoutId id="2147483998" r:id="rId10"/>
-    <p:sldLayoutId id="2147483999" r:id="rId11"/>
-    <p:sldLayoutId id="2147484000" r:id="rId12"/>
-    <p:sldLayoutId id="2147484001" r:id="rId13"/>
-    <p:sldLayoutId id="2147483961" r:id="rId14"/>
-    <p:sldLayoutId id="2147483973" r:id="rId15"/>
-    <p:sldLayoutId id="2147483972" r:id="rId16"/>
+    <p:sldLayoutId id="2147484003" r:id="rId1"/>
+    <p:sldLayoutId id="2147484004" r:id="rId2"/>
+    <p:sldLayoutId id="2147484005" r:id="rId3"/>
+    <p:sldLayoutId id="2147484006" r:id="rId4"/>
+    <p:sldLayoutId id="2147484007" r:id="rId5"/>
+    <p:sldLayoutId id="2147484008" r:id="rId6"/>
+    <p:sldLayoutId id="2147484009" r:id="rId7"/>
+    <p:sldLayoutId id="2147484010" r:id="rId8"/>
+    <p:sldLayoutId id="2147484011" r:id="rId9"/>
+    <p:sldLayoutId id="2147484012" r:id="rId10"/>
+    <p:sldLayoutId id="2147484013" r:id="rId11"/>
+    <p:sldLayoutId id="2147484014" r:id="rId12"/>
+    <p:sldLayoutId id="2147484015" r:id="rId13"/>
+    <p:sldLayoutId id="2147484016" r:id="rId14"/>
+    <p:sldLayoutId id="2147484017" r:id="rId15"/>
+    <p:sldLayoutId id="2147484018" r:id="rId16"/>
+    <p:sldLayoutId id="2147483961" r:id="rId17"/>
+    <p:sldLayoutId id="2147483973" r:id="rId18"/>
+    <p:sldLayoutId id="2147483972" r:id="rId19"/>
   </p:sldLayoutIdLst>
-  <p:hf hdr="0"/>
+  <p:hf hdr="0" dt="0"/>
   <p:txStyles>
     <p:titleStyle>
       <a:lvl1pPr algn="l" defTabSz="914400" rtl="0" eaLnBrk="1" latinLnBrk="0" hangingPunct="1">
@@ -6622,13 +8406,8 @@
             </a:pPr>
             <a:r>
               <a:rPr lang="en-US" dirty="0" smtClean="0"/>
-              <a:t>Object </a:t>
-            </a:r>
-            <a:r>
-              <a:rPr lang="en-US" dirty="0" smtClean="0"/>
-              <a:t>Design	</a:t>
-            </a:r>
-            <a:endParaRPr lang="en-US" dirty="0" smtClean="0"/>
+              <a:t>Object Design	</a:t>
+            </a:r>
           </a:p>
           <a:p>
             <a:pPr marL="955358" lvl="2" indent="-276225">
@@ -6850,12 +8629,12 @@
       </p:sp>
       <p:sp>
         <p:nvSpPr>
-          <p:cNvPr id="4" name="Date Placeholder 3"/>
-          <p:cNvSpPr>
-            <a:spLocks noGrp="1"/>
-          </p:cNvSpPr>
-          <p:nvPr>
-            <p:ph type="dt" sz="half" idx="10"/>
+          <p:cNvPr id="5" name="Footer Placeholder 4"/>
+          <p:cNvSpPr>
+            <a:spLocks noGrp="1"/>
+          </p:cNvSpPr>
+          <p:nvPr>
+            <p:ph type="ftr" sz="quarter" idx="11"/>
           </p:nvPr>
         </p:nvSpPr>
         <p:spPr/>
@@ -6863,33 +8642,10 @@
           <a:bodyPr/>
           <a:lstStyle/>
           <a:p>
-            <a:fld id="{D0913AF4-ACC5-3549-B060-3D77093E2559}" type="datetime2">
-              <a:rPr lang="en-US" smtClean="0"/>
-              <a:t>Wednesday, September 10, 14</a:t>
-            </a:fld>
-            <a:endParaRPr lang="en-US"/>
-          </a:p>
-        </p:txBody>
-      </p:sp>
-      <p:sp>
-        <p:nvSpPr>
-          <p:cNvPr id="5" name="Footer Placeholder 4"/>
-          <p:cNvSpPr>
-            <a:spLocks noGrp="1"/>
-          </p:cNvSpPr>
-          <p:nvPr>
-            <p:ph type="ftr" sz="quarter" idx="11"/>
-          </p:nvPr>
-        </p:nvSpPr>
-        <p:spPr/>
-        <p:txBody>
-          <a:bodyPr/>
-          <a:lstStyle/>
-          <a:p>
             <a:pPr algn="r"/>
             <a:r>
               <a:rPr lang="en-US" smtClean="0"/>
-              <a:t>Sanjay Kalé and PPL (UIUC) – Parallel Migratable Objects </a:t>
+              <a:t>Laxmikant Kalé and PPL (UIUC) – Parallel Migratable Objects </a:t>
             </a:r>
             <a:endParaRPr lang="en-US" dirty="0"/>
           </a:p>
@@ -7056,12 +8812,12 @@
       </p:sp>
       <p:sp>
         <p:nvSpPr>
-          <p:cNvPr id="3" name="Date Placeholder 2"/>
-          <p:cNvSpPr>
-            <a:spLocks noGrp="1"/>
-          </p:cNvSpPr>
-          <p:nvPr>
-            <p:ph type="dt" sz="half" idx="10"/>
+          <p:cNvPr id="8" name="Footer Placeholder 7"/>
+          <p:cNvSpPr>
+            <a:spLocks noGrp="1"/>
+          </p:cNvSpPr>
+          <p:nvPr>
+            <p:ph type="ftr" sz="quarter" idx="11"/>
           </p:nvPr>
         </p:nvSpPr>
         <p:spPr/>
@@ -7069,33 +8825,10 @@
           <a:bodyPr/>
           <a:lstStyle/>
           <a:p>
-            <a:fld id="{49648AE8-270A-8E4F-8CA2-BC696C306F18}" type="datetime2">
-              <a:rPr lang="en-US" smtClean="0"/>
-              <a:t>Wednesday, September 10, 14</a:t>
-            </a:fld>
-            <a:endParaRPr lang="en-US" dirty="0"/>
-          </a:p>
-        </p:txBody>
-      </p:sp>
-      <p:sp>
-        <p:nvSpPr>
-          <p:cNvPr id="8" name="Footer Placeholder 7"/>
-          <p:cNvSpPr>
-            <a:spLocks noGrp="1"/>
-          </p:cNvSpPr>
-          <p:nvPr>
-            <p:ph type="ftr" sz="quarter" idx="11"/>
-          </p:nvPr>
-        </p:nvSpPr>
-        <p:spPr/>
-        <p:txBody>
-          <a:bodyPr/>
-          <a:lstStyle/>
-          <a:p>
             <a:pPr algn="r"/>
             <a:r>
               <a:rPr lang="en-US" smtClean="0"/>
-              <a:t>Sanjay Kalé and PPL (UIUC) – Parallel Migratable Objects </a:t>
+              <a:t>Laxmikant Kalé and PPL (UIUC) – Parallel Migratable Objects </a:t>
             </a:r>
             <a:endParaRPr lang="en-US" dirty="0"/>
           </a:p>
@@ -7838,12 +9571,12 @@
       </p:sp>
       <p:sp>
         <p:nvSpPr>
-          <p:cNvPr id="2" name="Date Placeholder 1"/>
-          <p:cNvSpPr>
-            <a:spLocks noGrp="1"/>
-          </p:cNvSpPr>
-          <p:nvPr>
-            <p:ph type="dt" sz="half" idx="10"/>
+          <p:cNvPr id="8" name="Footer Placeholder 7"/>
+          <p:cNvSpPr>
+            <a:spLocks noGrp="1"/>
+          </p:cNvSpPr>
+          <p:nvPr>
+            <p:ph type="ftr" sz="quarter" idx="11"/>
           </p:nvPr>
         </p:nvSpPr>
         <p:spPr/>
@@ -7851,33 +9584,10 @@
           <a:bodyPr/>
           <a:lstStyle/>
           <a:p>
-            <a:fld id="{4E245537-FD01-C04E-9FE8-74F7CCF20F26}" type="datetime2">
-              <a:rPr lang="en-US" smtClean="0"/>
-              <a:t>Wednesday, September 10, 14</a:t>
-            </a:fld>
-            <a:endParaRPr lang="en-US" dirty="0"/>
-          </a:p>
-        </p:txBody>
-      </p:sp>
-      <p:sp>
-        <p:nvSpPr>
-          <p:cNvPr id="8" name="Footer Placeholder 7"/>
-          <p:cNvSpPr>
-            <a:spLocks noGrp="1"/>
-          </p:cNvSpPr>
-          <p:nvPr>
-            <p:ph type="ftr" sz="quarter" idx="11"/>
-          </p:nvPr>
-        </p:nvSpPr>
-        <p:spPr/>
-        <p:txBody>
-          <a:bodyPr/>
-          <a:lstStyle/>
-          <a:p>
             <a:pPr algn="r"/>
             <a:r>
               <a:rPr lang="en-US" smtClean="0"/>
-              <a:t>Sanjay Kalé and PPL (UIUC) – Parallel Migratable Objects </a:t>
+              <a:t>Laxmikant Kalé and PPL (UIUC) – Parallel Migratable Objects </a:t>
             </a:r>
             <a:endParaRPr lang="en-US" dirty="0"/>
           </a:p>
@@ -8893,7 +10603,7 @@
               </a:ext>
             </a:extLst>
           </a:blip>
-          <a:srcRect t="-72227" b="-72227"/>
+          <a:srcRect l="29547" r="29547"/>
           <a:stretch>
             <a:fillRect/>
           </a:stretch>
@@ -8902,12 +10612,12 @@
       </p:pic>
       <p:sp>
         <p:nvSpPr>
-          <p:cNvPr id="3" name="Date Placeholder 2"/>
-          <p:cNvSpPr>
-            <a:spLocks noGrp="1"/>
-          </p:cNvSpPr>
-          <p:nvPr>
-            <p:ph type="dt" sz="half" idx="10"/>
+          <p:cNvPr id="5" name="Footer Placeholder 4"/>
+          <p:cNvSpPr>
+            <a:spLocks noGrp="1"/>
+          </p:cNvSpPr>
+          <p:nvPr>
+            <p:ph type="ftr" sz="quarter" idx="11"/>
           </p:nvPr>
         </p:nvSpPr>
         <p:spPr/>
@@ -8915,33 +10625,10 @@
           <a:bodyPr/>
           <a:lstStyle/>
           <a:p>
-            <a:fld id="{2A453F59-66CD-474C-80FB-0E2B578AA752}" type="datetime2">
-              <a:rPr lang="en-US" smtClean="0"/>
-              <a:t>Wednesday, September 10, 14</a:t>
-            </a:fld>
-            <a:endParaRPr lang="en-US"/>
-          </a:p>
-        </p:txBody>
-      </p:sp>
-      <p:sp>
-        <p:nvSpPr>
-          <p:cNvPr id="5" name="Footer Placeholder 4"/>
-          <p:cNvSpPr>
-            <a:spLocks noGrp="1"/>
-          </p:cNvSpPr>
-          <p:nvPr>
-            <p:ph type="ftr" sz="quarter" idx="11"/>
-          </p:nvPr>
-        </p:nvSpPr>
-        <p:spPr/>
-        <p:txBody>
-          <a:bodyPr/>
-          <a:lstStyle/>
-          <a:p>
             <a:pPr algn="r"/>
             <a:r>
               <a:rPr lang="en-US" smtClean="0"/>
-              <a:t>Sanjay Kalé and PPL (UIUC) – Parallel Migratable Objects </a:t>
+              <a:t>Laxmikant Kalé and PPL (UIUC) – Parallel Migratable Objects </a:t>
             </a:r>
             <a:endParaRPr lang="en-US" dirty="0"/>
           </a:p>
@@ -9200,12 +10887,12 @@
       </p:sp>
       <p:sp>
         <p:nvSpPr>
-          <p:cNvPr id="4" name="Date Placeholder 3"/>
-          <p:cNvSpPr>
-            <a:spLocks noGrp="1"/>
-          </p:cNvSpPr>
-          <p:nvPr>
-            <p:ph type="dt" sz="half" idx="10"/>
+          <p:cNvPr id="5" name="Footer Placeholder 4"/>
+          <p:cNvSpPr>
+            <a:spLocks noGrp="1"/>
+          </p:cNvSpPr>
+          <p:nvPr>
+            <p:ph type="ftr" sz="quarter" idx="11"/>
           </p:nvPr>
         </p:nvSpPr>
         <p:spPr/>
@@ -9213,33 +10900,10 @@
           <a:bodyPr/>
           <a:lstStyle/>
           <a:p>
-            <a:fld id="{5E92D53F-7FBE-A64C-93CF-96420A1E5265}" type="datetime2">
-              <a:rPr lang="en-US" smtClean="0"/>
-              <a:t>Wednesday, September 10, 14</a:t>
-            </a:fld>
-            <a:endParaRPr lang="en-US"/>
-          </a:p>
-        </p:txBody>
-      </p:sp>
-      <p:sp>
-        <p:nvSpPr>
-          <p:cNvPr id="5" name="Footer Placeholder 4"/>
-          <p:cNvSpPr>
-            <a:spLocks noGrp="1"/>
-          </p:cNvSpPr>
-          <p:nvPr>
-            <p:ph type="ftr" sz="quarter" idx="11"/>
-          </p:nvPr>
-        </p:nvSpPr>
-        <p:spPr/>
-        <p:txBody>
-          <a:bodyPr/>
-          <a:lstStyle/>
-          <a:p>
             <a:pPr algn="r"/>
             <a:r>
               <a:rPr lang="en-US" smtClean="0"/>
-              <a:t>Sanjay Kalé and PPL (UIUC) – Parallel Migratable Objects </a:t>
+              <a:t>Laxmikant Kalé and PPL (UIUC) – Parallel Migratable Objects </a:t>
             </a:r>
             <a:endParaRPr lang="en-US" dirty="0"/>
           </a:p>
@@ -9447,12 +11111,12 @@
       </p:sp>
       <p:sp>
         <p:nvSpPr>
-          <p:cNvPr id="4" name="Date Placeholder 3"/>
-          <p:cNvSpPr>
-            <a:spLocks noGrp="1"/>
-          </p:cNvSpPr>
-          <p:nvPr>
-            <p:ph type="dt" sz="half" idx="10"/>
+          <p:cNvPr id="5" name="Footer Placeholder 4"/>
+          <p:cNvSpPr>
+            <a:spLocks noGrp="1"/>
+          </p:cNvSpPr>
+          <p:nvPr>
+            <p:ph type="ftr" sz="quarter" idx="11"/>
           </p:nvPr>
         </p:nvSpPr>
         <p:spPr/>
@@ -9460,33 +11124,10 @@
           <a:bodyPr/>
           <a:lstStyle/>
           <a:p>
-            <a:fld id="{FF29F566-044B-7448-9BD6-90F1761B0BF9}" type="datetime2">
-              <a:rPr lang="en-US" smtClean="0"/>
-              <a:t>Wednesday, September 10, 14</a:t>
-            </a:fld>
-            <a:endParaRPr lang="en-US"/>
-          </a:p>
-        </p:txBody>
-      </p:sp>
-      <p:sp>
-        <p:nvSpPr>
-          <p:cNvPr id="5" name="Footer Placeholder 4"/>
-          <p:cNvSpPr>
-            <a:spLocks noGrp="1"/>
-          </p:cNvSpPr>
-          <p:nvPr>
-            <p:ph type="ftr" sz="quarter" idx="11"/>
-          </p:nvPr>
-        </p:nvSpPr>
-        <p:spPr/>
-        <p:txBody>
-          <a:bodyPr/>
-          <a:lstStyle/>
-          <a:p>
             <a:pPr algn="r"/>
             <a:r>
               <a:rPr lang="en-US" smtClean="0"/>
-              <a:t>Sanjay Kalé and PPL (UIUC) – Parallel Migratable Objects </a:t>
+              <a:t>Laxmikant Kalé and PPL (UIUC) – Parallel Migratable Objects </a:t>
             </a:r>
             <a:endParaRPr lang="en-US" dirty="0"/>
           </a:p>

</xml_diff>

<commit_message>
tut 2: Put ckout on a single line
</commit_message>
<xml_diff>
--- a/tutorial-02-hello_world.pptx
+++ b/tutorial-02-hello_world.pptx
@@ -206,7 +206,7 @@
           <a:p>
             <a:fld id="{775CE290-E0F5-444C-B849-A8F17CD4104C}" type="datetimeFigureOut">
               <a:rPr lang="en-US" smtClean="0"/>
-              <a:t>9/12/14</a:t>
+              <a:t>11/16/14</a:t>
             </a:fld>
             <a:endParaRPr lang="en-US"/>
           </a:p>
@@ -372,7 +372,7 @@
           <a:p>
             <a:fld id="{AD53A24C-4135-094C-957B-35852E7EDFA4}" type="datetimeFigureOut">
               <a:rPr lang="en-US" smtClean="0"/>
-              <a:t>9/12/14</a:t>
+              <a:t>11/16/14</a:t>
             </a:fld>
             <a:endParaRPr lang="en-US"/>
           </a:p>
@@ -833,7 +833,7 @@
           <a:p>
             <a:fld id="{3652D34B-1481-1D4E-B09A-E41225373634}" type="datetime2">
               <a:rPr lang="en-US" smtClean="0"/>
-              <a:t>Friday, September 12, 14</a:t>
+              <a:t>Sunday, November 16, 14</a:t>
             </a:fld>
             <a:endParaRPr lang="en-US"/>
           </a:p>
@@ -1136,7 +1136,7 @@
                 <a:latin typeface="Times New Roman"/>
                 <a:cs typeface="Times New Roman"/>
               </a:rPr>
-              <a:t>September 12, 2014</a:t>
+              <a:t>November 16, 2014</a:t>
             </a:fld>
             <a:endParaRPr lang="en-US" dirty="0">
               <a:latin typeface="Times New Roman"/>
@@ -1410,7 +1410,7 @@
                 <a:latin typeface="Times New Roman"/>
                 <a:cs typeface="Times New Roman"/>
               </a:rPr>
-              <a:t>September 12, 2014</a:t>
+              <a:t>November 16, 2014</a:t>
             </a:fld>
             <a:endParaRPr lang="en-US" dirty="0">
               <a:latin typeface="Times New Roman"/>
@@ -1633,7 +1633,7 @@
                 <a:latin typeface="Times New Roman"/>
                 <a:cs typeface="Times New Roman"/>
               </a:rPr>
-              <a:t>September 12, 2014</a:t>
+              <a:t>November 16, 2014</a:t>
             </a:fld>
             <a:endParaRPr lang="en-US" dirty="0">
               <a:latin typeface="Times New Roman"/>
@@ -1868,7 +1868,7 @@
           <a:p>
             <a:fld id="{F0A152E4-32F9-4546-9C15-BF5609F2BEFF}" type="datetime2">
               <a:rPr lang="en-US" smtClean="0"/>
-              <a:t>Friday, September 12, 14</a:t>
+              <a:t>Sunday, November 16, 14</a:t>
             </a:fld>
             <a:endParaRPr lang="en-US"/>
           </a:p>
@@ -2179,7 +2179,7 @@
           <a:p>
             <a:fld id="{B56FE1C6-3E0C-6949-ADE3-7CF787614FD0}" type="datetime2">
               <a:rPr lang="en-US" smtClean="0"/>
-              <a:t>Friday, September 12, 14</a:t>
+              <a:t>Sunday, November 16, 14</a:t>
             </a:fld>
             <a:endParaRPr lang="en-US"/>
           </a:p>
@@ -2350,7 +2350,7 @@
           <a:p>
             <a:fld id="{252E3A9B-DAFE-994E-A988-929267522860}" type="datetime2">
               <a:rPr lang="en-US" smtClean="0"/>
-              <a:t>Friday, September 12, 14</a:t>
+              <a:t>Sunday, November 16, 14</a:t>
             </a:fld>
             <a:endParaRPr lang="en-US"/>
           </a:p>
@@ -2531,7 +2531,7 @@
           <a:p>
             <a:fld id="{9183BCBC-5907-4448-873A-3DDC09B4DF44}" type="datetime2">
               <a:rPr lang="en-US" smtClean="0"/>
-              <a:t>Friday, September 12, 14</a:t>
+              <a:t>Sunday, November 16, 14</a:t>
             </a:fld>
             <a:endParaRPr lang="en-US"/>
           </a:p>
@@ -2785,7 +2785,7 @@
           <a:p>
             <a:fld id="{59ED30DC-E902-5141-B9E1-1D35C19796E1}" type="datetime2">
               <a:rPr lang="en-US" smtClean="0"/>
-              <a:t>Friday, September 12, 14</a:t>
+              <a:t>Sunday, November 16, 14</a:t>
             </a:fld>
             <a:endParaRPr lang="en-US"/>
           </a:p>
@@ -3088,7 +3088,7 @@
                 <a:latin typeface="Times New Roman"/>
                 <a:cs typeface="Times New Roman"/>
               </a:rPr>
-              <a:t>September 12, 2014</a:t>
+              <a:t>November 16, 2014</a:t>
             </a:fld>
             <a:endParaRPr lang="en-US" dirty="0">
               <a:latin typeface="Times New Roman"/>
@@ -3362,7 +3362,7 @@
                 <a:latin typeface="Times New Roman"/>
                 <a:cs typeface="Times New Roman"/>
               </a:rPr>
-              <a:t>September 12, 2014</a:t>
+              <a:t>November 16, 2014</a:t>
             </a:fld>
             <a:endParaRPr lang="en-US" dirty="0">
               <a:latin typeface="Times New Roman"/>
@@ -3436,7 +3436,7 @@
           <a:p>
             <a:fld id="{EFB082D6-DFA6-354E-8E01-57AA34489CC9}" type="datetime2">
               <a:rPr lang="en-US" smtClean="0"/>
-              <a:t>Friday, September 12, 14</a:t>
+              <a:t>Sunday, November 16, 14</a:t>
             </a:fld>
             <a:endParaRPr lang="en-US" dirty="0"/>
           </a:p>
@@ -3965,7 +3965,7 @@
           <a:p>
             <a:fld id="{0BBD8AA5-66C9-704A-88B6-F5F1B3C387C4}" type="datetime2">
               <a:rPr lang="en-US" smtClean="0"/>
-              <a:t>Friday, September 12, 14</a:t>
+              <a:t>Sunday, November 16, 14</a:t>
             </a:fld>
             <a:endParaRPr lang="en-US" dirty="0"/>
           </a:p>
@@ -4343,7 +4343,7 @@
           <a:p>
             <a:fld id="{23CCB914-A2D4-7F4B-B230-36C8BB32B5CF}" type="datetime2">
               <a:rPr lang="en-US" smtClean="0"/>
-              <a:t>Friday, September 12, 14</a:t>
+              <a:t>Sunday, November 16, 14</a:t>
             </a:fld>
             <a:endParaRPr lang="en-US"/>
           </a:p>
@@ -4646,7 +4646,7 @@
                 <a:latin typeface="Times New Roman"/>
                 <a:cs typeface="Times New Roman"/>
               </a:rPr>
-              <a:t>September 12, 2014</a:t>
+              <a:t>November 16, 2014</a:t>
             </a:fld>
             <a:endParaRPr lang="en-US" dirty="0">
               <a:latin typeface="Times New Roman"/>
@@ -4772,7 +4772,7 @@
           <a:p>
             <a:fld id="{7619AD58-97C8-5543-8980-2F4B4EC54B98}" type="datetime2">
               <a:rPr lang="en-US" smtClean="0"/>
-              <a:t>Friday, September 12, 14</a:t>
+              <a:t>Sunday, November 16, 14</a:t>
             </a:fld>
             <a:endParaRPr lang="en-US" dirty="0"/>
           </a:p>
@@ -5301,7 +5301,7 @@
           <a:p>
             <a:fld id="{C8BEFB79-43D4-F843-B627-86B5BAA30CA6}" type="datetime2">
               <a:rPr lang="en-US" smtClean="0"/>
-              <a:t>Friday, September 12, 14</a:t>
+              <a:t>Sunday, November 16, 14</a:t>
             </a:fld>
             <a:endParaRPr lang="en-US" dirty="0"/>
           </a:p>
@@ -5597,7 +5597,7 @@
           <a:p>
             <a:fld id="{C94FA05A-A646-C047-9E42-F21E71804449}" type="datetime2">
               <a:rPr lang="en-US" smtClean="0"/>
-              <a:t>Friday, September 12, 14</a:t>
+              <a:t>Sunday, November 16, 14</a:t>
             </a:fld>
             <a:endParaRPr lang="en-US"/>
           </a:p>
@@ -5716,7 +5716,7 @@
           <a:p>
             <a:fld id="{94ABA898-3F0D-0249-B9AE-E17E4EEDD066}" type="datetime2">
               <a:rPr lang="en-US" smtClean="0"/>
-              <a:t>Friday, September 12, 14</a:t>
+              <a:t>Sunday, November 16, 14</a:t>
             </a:fld>
             <a:endParaRPr lang="en-US" dirty="0"/>
           </a:p>
@@ -6203,7 +6203,7 @@
           <a:p>
             <a:fld id="{FA46681B-8DC4-4643-940D-3A4E4BD92F3F}" type="datetime2">
               <a:rPr lang="en-US" smtClean="0"/>
-              <a:t>Friday, September 12, 14</a:t>
+              <a:t>Sunday, November 16, 14</a:t>
             </a:fld>
             <a:endParaRPr lang="en-US"/>
           </a:p>
@@ -6534,7 +6534,7 @@
           <a:p>
             <a:fld id="{34CC2202-E828-0E49-9E4A-9C01A549A1E0}" type="datetime2">
               <a:rPr lang="en-US" smtClean="0"/>
-              <a:t>Friday, September 12, 14</a:t>
+              <a:t>Sunday, November 16, 14</a:t>
             </a:fld>
             <a:endParaRPr lang="en-US" dirty="0"/>
           </a:p>
@@ -7013,7 +7013,7 @@
           <a:p>
             <a:fld id="{A6EA3A8F-8D9B-8A47-95C9-7995BAC45FBF}" type="datetime2">
               <a:rPr lang="en-US" smtClean="0"/>
-              <a:t>Friday, September 12, 14</a:t>
+              <a:t>Sunday, November 16, 14</a:t>
             </a:fld>
             <a:endParaRPr lang="en-US"/>
           </a:p>
@@ -7309,7 +7309,7 @@
           <a:p>
             <a:fld id="{CFDEB2E7-57A4-234B-9CFF-1F183E3F5D73}" type="datetime2">
               <a:rPr lang="en-US" smtClean="0"/>
-              <a:t>Friday, September 12, 14</a:t>
+              <a:t>Sunday, November 16, 14</a:t>
             </a:fld>
             <a:endParaRPr lang="en-US" dirty="0"/>
           </a:p>
@@ -7552,7 +7552,7 @@
           <a:p>
             <a:fld id="{115C7BD9-ED9E-704A-B712-0697507D34CB}" type="datetime2">
               <a:rPr lang="en-US" smtClean="0"/>
-              <a:t>Friday, September 12, 14</a:t>
+              <a:t>Sunday, November 16, 14</a:t>
             </a:fld>
             <a:endParaRPr lang="en-US"/>
           </a:p>
@@ -7648,7 +7648,7 @@
           <a:p>
             <a:fld id="{C573A39A-5B53-5849-9763-2A025C30296E}" type="datetime2">
               <a:rPr lang="en-US" smtClean="0"/>
-              <a:t>Friday, September 12, 14</a:t>
+              <a:t>Sunday, November 16, 14</a:t>
             </a:fld>
             <a:endParaRPr lang="en-US"/>
           </a:p>
@@ -7963,7 +7963,7 @@
           <a:p>
             <a:fld id="{C845D6B7-6A28-554B-92F8-A13C2D0C3061}" type="datetime2">
               <a:rPr lang="en-US" smtClean="0"/>
-              <a:t>Friday, September 12, 14</a:t>
+              <a:t>Sunday, November 16, 14</a:t>
             </a:fld>
             <a:endParaRPr lang="en-US" dirty="0"/>
           </a:p>
@@ -9725,7 +9725,7 @@
         </p:spPr>
         <p:txBody>
           <a:bodyPr>
-            <a:normAutofit lnSpcReduction="10000"/>
+            <a:normAutofit/>
           </a:bodyPr>
           <a:lstStyle/>
           <a:p>
@@ -9767,14 +9767,47 @@
                 <a:latin typeface="Consolas"/>
                 <a:cs typeface="Consolas"/>
               </a:rPr>
+              <a:t> </a:t>
+            </a:r>
+            <a:r>
+              <a:rPr lang="en-US" sz="1900" b="1" dirty="0" err="1" smtClean="0">
+                <a:latin typeface="Consolas"/>
+                <a:cs typeface="Consolas"/>
+              </a:rPr>
+              <a:t>mainchare</a:t>
+            </a:r>
+            <a:r>
+              <a:rPr lang="en-US" sz="1900" dirty="0" smtClean="0">
+                <a:latin typeface="Consolas"/>
+                <a:cs typeface="Consolas"/>
+              </a:rPr>
+              <a:t> </a:t>
+            </a:r>
+            <a:r>
+              <a:rPr lang="en-US" sz="1900" dirty="0">
+                <a:latin typeface="Consolas"/>
+                <a:cs typeface="Consolas"/>
+              </a:rPr>
+              <a:t>Main {</a:t>
+            </a:r>
+          </a:p>
+          <a:p>
+            <a:pPr marL="0" indent="0">
+              <a:buNone/>
+            </a:pPr>
+            <a:r>
+              <a:rPr lang="en-US" sz="1900" dirty="0" smtClean="0">
+                <a:latin typeface="Consolas"/>
+                <a:cs typeface="Consolas"/>
+              </a:rPr>
               <a:t>  </a:t>
             </a:r>
             <a:r>
-              <a:rPr lang="en-US" sz="1900" b="1" dirty="0" err="1" smtClean="0">
-                <a:latin typeface="Consolas"/>
-                <a:cs typeface="Consolas"/>
-              </a:rPr>
-              <a:t>mainchare</a:t>
+              <a:rPr lang="en-US" sz="1900" dirty="0">
+                <a:latin typeface="Consolas"/>
+                <a:cs typeface="Consolas"/>
+              </a:rPr>
+              <a:t> </a:t>
             </a:r>
             <a:r>
               <a:rPr lang="en-US" sz="1900" dirty="0" smtClean="0">
@@ -9782,25 +9815,6 @@
                 <a:cs typeface="Consolas"/>
               </a:rPr>
               <a:t> </a:t>
-            </a:r>
-            <a:r>
-              <a:rPr lang="en-US" sz="1900" dirty="0">
-                <a:latin typeface="Consolas"/>
-                <a:cs typeface="Consolas"/>
-              </a:rPr>
-              <a:t>Main {</a:t>
-            </a:r>
-          </a:p>
-          <a:p>
-            <a:pPr marL="0" indent="0">
-              <a:buNone/>
-            </a:pPr>
-            <a:r>
-              <a:rPr lang="en-US" sz="1900" dirty="0" smtClean="0">
-                <a:latin typeface="Consolas"/>
-                <a:cs typeface="Consolas"/>
-              </a:rPr>
-              <a:t>      </a:t>
             </a:r>
             <a:r>
               <a:rPr lang="en-US" sz="1900" b="1" dirty="0" smtClean="0">
@@ -9858,7 +9872,14 @@
                 <a:latin typeface="Consolas"/>
                 <a:cs typeface="Consolas"/>
               </a:rPr>
-              <a:t>  }</a:t>
+              <a:t> </a:t>
+            </a:r>
+            <a:r>
+              <a:rPr lang="en-US" sz="1900" dirty="0" smtClean="0">
+                <a:latin typeface="Consolas"/>
+                <a:cs typeface="Consolas"/>
+              </a:rPr>
+              <a:t>}</a:t>
             </a:r>
             <a:r>
               <a:rPr lang="en-US" sz="1900" dirty="0">
@@ -9877,7 +9898,7 @@
                 <a:latin typeface="Consolas"/>
                 <a:cs typeface="Consolas"/>
               </a:rPr>
-              <a:t>   </a:t>
+              <a:t>  </a:t>
             </a:r>
             <a:r>
               <a:rPr lang="en-US" sz="1900" b="1" dirty="0" err="1" smtClean="0">
@@ -9921,7 +9942,7 @@
                 <a:latin typeface="Consolas"/>
                 <a:cs typeface="Consolas"/>
               </a:rPr>
-              <a:t>     </a:t>
+              <a:t>   </a:t>
             </a:r>
             <a:r>
               <a:rPr lang="en-US" sz="1900" b="1" dirty="0" smtClean="0">
@@ -9954,7 +9975,21 @@
                 <a:latin typeface="Consolas"/>
                 <a:cs typeface="Consolas"/>
               </a:rPr>
-              <a:t>   };</a:t>
+              <a:t>  </a:t>
+            </a:r>
+            <a:r>
+              <a:rPr lang="en-US" sz="1900" dirty="0" smtClean="0">
+                <a:latin typeface="Consolas"/>
+                <a:cs typeface="Consolas"/>
+              </a:rPr>
+              <a:t>}</a:t>
+            </a:r>
+            <a:r>
+              <a:rPr lang="en-US" sz="1900" dirty="0" smtClean="0">
+                <a:latin typeface="Consolas"/>
+                <a:cs typeface="Consolas"/>
+              </a:rPr>
+              <a:t>;</a:t>
             </a:r>
           </a:p>
           <a:p>
@@ -10153,47 +10188,68 @@
                 <a:latin typeface="Consolas"/>
                 <a:cs typeface="Consolas"/>
               </a:rPr>
+              <a:t> </a:t>
+            </a:r>
+            <a:r>
+              <a:rPr lang="en-US" b="1" dirty="0" smtClean="0">
+                <a:latin typeface="Consolas"/>
+                <a:cs typeface="Consolas"/>
+              </a:rPr>
+              <a:t>public</a:t>
+            </a:r>
+            <a:r>
+              <a:rPr lang="en-US" dirty="0">
+                <a:latin typeface="Consolas"/>
+                <a:cs typeface="Consolas"/>
+              </a:rPr>
+              <a:t>: Main(</a:t>
+            </a:r>
+            <a:r>
+              <a:rPr lang="en-US" dirty="0" err="1">
+                <a:latin typeface="Consolas"/>
+                <a:cs typeface="Consolas"/>
+              </a:rPr>
+              <a:t>CkArgMsg</a:t>
+            </a:r>
+            <a:r>
+              <a:rPr lang="en-US" dirty="0">
+                <a:latin typeface="Consolas"/>
+                <a:cs typeface="Consolas"/>
+              </a:rPr>
+              <a:t>∗ m) {</a:t>
+            </a:r>
+          </a:p>
+          <a:p>
+            <a:pPr marL="0" indent="0">
+              <a:buNone/>
+            </a:pPr>
+            <a:r>
+              <a:rPr lang="en-US" dirty="0" smtClean="0">
+                <a:latin typeface="Consolas"/>
+                <a:cs typeface="Consolas"/>
+              </a:rPr>
               <a:t>  </a:t>
             </a:r>
             <a:r>
-              <a:rPr lang="en-US" b="1" dirty="0" smtClean="0">
-                <a:latin typeface="Consolas"/>
-                <a:cs typeface="Consolas"/>
-              </a:rPr>
-              <a:t>public</a:t>
-            </a:r>
-            <a:r>
               <a:rPr lang="en-US" dirty="0">
                 <a:latin typeface="Consolas"/>
                 <a:cs typeface="Consolas"/>
               </a:rPr>
-              <a:t>: Main(</a:t>
-            </a:r>
-            <a:r>
-              <a:rPr lang="en-US" dirty="0" err="1">
-                <a:latin typeface="Consolas"/>
-                <a:cs typeface="Consolas"/>
-              </a:rPr>
-              <a:t>CkArgMsg</a:t>
-            </a:r>
-            <a:r>
-              <a:rPr lang="en-US" dirty="0">
-                <a:latin typeface="Consolas"/>
-                <a:cs typeface="Consolas"/>
-              </a:rPr>
-              <a:t>∗ m) {</a:t>
-            </a:r>
-          </a:p>
-          <a:p>
-            <a:pPr marL="0" indent="0">
-              <a:buNone/>
-            </a:pPr>
+              <a:t> </a:t>
+            </a:r>
             <a:r>
               <a:rPr lang="en-US" dirty="0" smtClean="0">
                 <a:latin typeface="Consolas"/>
                 <a:cs typeface="Consolas"/>
               </a:rPr>
-              <a:t>      CProxy_Singleton</a:t>
+              <a:t> </a:t>
+            </a:r>
+            <a:r>
+              <a:rPr lang="en-US" dirty="0" err="1" smtClean="0">
+                <a:latin typeface="Consolas"/>
+                <a:cs typeface="Consolas"/>
+              </a:rPr>
+              <a:t>CProxy_Singleton</a:t>
             </a:r>
             <a:r>
               <a:rPr lang="en-US" dirty="0">
@@ -10237,7 +10293,14 @@
                 <a:latin typeface="Consolas"/>
                 <a:cs typeface="Consolas"/>
               </a:rPr>
-              <a:t>  }</a:t>
+              <a:t> </a:t>
+            </a:r>
+            <a:r>
+              <a:rPr lang="en-US" dirty="0" smtClean="0">
+                <a:latin typeface="Consolas"/>
+                <a:cs typeface="Consolas"/>
+              </a:rPr>
+              <a:t>}</a:t>
             </a:r>
             <a:r>
               <a:rPr lang="en-US" dirty="0">
@@ -10288,43 +10351,6 @@
               </a:rPr>
               <a:t> Singleton : </a:t>
             </a:r>
-            <a:r>
-              <a:rPr lang="en-US" b="1" dirty="0">
-                <a:latin typeface="Consolas"/>
-                <a:cs typeface="Consolas"/>
-              </a:rPr>
-              <a:t>public </a:t>
-            </a:r>
-            <a:endParaRPr lang="en-US" b="1" dirty="0" smtClean="0">
-              <a:latin typeface="Consolas"/>
-              <a:cs typeface="Consolas"/>
-            </a:endParaRPr>
-          </a:p>
-          <a:p>
-            <a:pPr marL="0" indent="0">
-              <a:buNone/>
-            </a:pPr>
-            <a:r>
-              <a:rPr lang="en-US" dirty="0">
-                <a:latin typeface="Consolas"/>
-                <a:cs typeface="Consolas"/>
-              </a:rPr>
-              <a:t> </a:t>
-            </a:r>
-            <a:r>
-              <a:rPr lang="en-US" dirty="0" smtClean="0">
-                <a:latin typeface="Consolas"/>
-                <a:cs typeface="Consolas"/>
-              </a:rPr>
-              <a:t>     CBase_Singleton </a:t>
-            </a:r>
-            <a:r>
-              <a:rPr lang="en-US" dirty="0">
-                <a:latin typeface="Consolas"/>
-                <a:cs typeface="Consolas"/>
-              </a:rPr>
-              <a:t>{ </a:t>
-            </a:r>
             <a:endParaRPr lang="en-US" dirty="0" smtClean="0">
               <a:latin typeface="Consolas"/>
               <a:cs typeface="Consolas"/>
@@ -10335,65 +10361,32 @@
               <a:buNone/>
             </a:pPr>
             <a:r>
+              <a:rPr lang="en-US" b="1" dirty="0" smtClean="0">
+                <a:latin typeface="Consolas"/>
+                <a:cs typeface="Consolas"/>
+              </a:rPr>
+              <a:t>         public </a:t>
+            </a:r>
+            <a:r>
+              <a:rPr lang="en-US" dirty="0" err="1" smtClean="0">
+                <a:latin typeface="Consolas"/>
+                <a:cs typeface="Consolas"/>
+              </a:rPr>
+              <a:t>CBase_Singleton</a:t>
+            </a:r>
+            <a:r>
+              <a:rPr lang="en-US" dirty="0" smtClean="0">
+                <a:latin typeface="Consolas"/>
+                <a:cs typeface="Consolas"/>
+              </a:rPr>
+              <a:t> </a:t>
+            </a:r>
+            <a:r>
               <a:rPr lang="en-US" dirty="0">
                 <a:latin typeface="Consolas"/>
                 <a:cs typeface="Consolas"/>
               </a:rPr>
-              <a:t> </a:t>
-            </a:r>
-            <a:r>
-              <a:rPr lang="en-US" dirty="0" smtClean="0">
-                <a:latin typeface="Consolas"/>
-                <a:cs typeface="Consolas"/>
-              </a:rPr>
-              <a:t>  </a:t>
-            </a:r>
-            <a:r>
-              <a:rPr lang="en-US" b="1" dirty="0" smtClean="0">
-                <a:latin typeface="Consolas"/>
-                <a:cs typeface="Consolas"/>
-              </a:rPr>
-              <a:t>public</a:t>
-            </a:r>
-            <a:r>
-              <a:rPr lang="en-US" dirty="0">
-                <a:latin typeface="Consolas"/>
-                <a:cs typeface="Consolas"/>
-              </a:rPr>
-              <a:t>: Singleton() {</a:t>
-            </a:r>
-          </a:p>
-          <a:p>
-            <a:pPr marL="0" indent="0">
-              <a:buNone/>
-            </a:pPr>
-            <a:r>
-              <a:rPr lang="en-US" dirty="0" smtClean="0">
-                <a:latin typeface="Consolas"/>
-                <a:cs typeface="Consolas"/>
-              </a:rPr>
-              <a:t>      </a:t>
-            </a:r>
-            <a:r>
-              <a:rPr lang="en-US" dirty="0" err="1" smtClean="0">
-                <a:latin typeface="Consolas"/>
-                <a:cs typeface="Consolas"/>
-              </a:rPr>
-              <a:t>ckout</a:t>
-            </a:r>
-            <a:r>
-              <a:rPr lang="en-US" dirty="0" smtClean="0">
-                <a:latin typeface="Consolas"/>
-                <a:cs typeface="Consolas"/>
-              </a:rPr>
-              <a:t> </a:t>
-            </a:r>
-            <a:r>
-              <a:rPr lang="en-US" dirty="0">
-                <a:latin typeface="Consolas"/>
-                <a:cs typeface="Consolas"/>
-              </a:rPr>
-              <a:t>&lt;&lt; ”Hello World!” </a:t>
+              <a:t>{ </a:t>
             </a:r>
             <a:endParaRPr lang="en-US" dirty="0" smtClean="0">
               <a:latin typeface="Consolas"/>
@@ -10405,28 +10398,89 @@
               <a:buNone/>
             </a:pPr>
             <a:r>
-              <a:rPr lang="en-US">
-                <a:latin typeface="Consolas"/>
-                <a:cs typeface="Consolas"/>
-              </a:rPr>
-              <a:t>	</a:t>
-            </a:r>
-            <a:r>
-              <a:rPr lang="en-US" smtClean="0">
-                <a:latin typeface="Consolas"/>
-                <a:cs typeface="Consolas"/>
-              </a:rPr>
-              <a:t>&lt;</a:t>
-            </a:r>
-            <a:r>
               <a:rPr lang="en-US" dirty="0">
                 <a:latin typeface="Consolas"/>
                 <a:cs typeface="Consolas"/>
               </a:rPr>
-              <a:t>&lt; </a:t>
-            </a:r>
-            <a:r>
-              <a:rPr lang="en-US" dirty="0" err="1">
+              <a:t> </a:t>
+            </a:r>
+            <a:r>
+              <a:rPr lang="en-US" dirty="0" smtClean="0">
+                <a:latin typeface="Consolas"/>
+                <a:cs typeface="Consolas"/>
+              </a:rPr>
+              <a:t> </a:t>
+            </a:r>
+            <a:r>
+              <a:rPr lang="en-US" b="1" dirty="0" smtClean="0">
+                <a:latin typeface="Consolas"/>
+                <a:cs typeface="Consolas"/>
+              </a:rPr>
+              <a:t>public</a:t>
+            </a:r>
+            <a:r>
+              <a:rPr lang="en-US" dirty="0">
+                <a:latin typeface="Consolas"/>
+                <a:cs typeface="Consolas"/>
+              </a:rPr>
+              <a:t>: Singleton() {</a:t>
+            </a:r>
+          </a:p>
+          <a:p>
+            <a:pPr marL="0" indent="0">
+              <a:buNone/>
+            </a:pPr>
+            <a:r>
+              <a:rPr lang="en-US" dirty="0" smtClean="0">
+                <a:latin typeface="Consolas"/>
+                <a:cs typeface="Consolas"/>
+              </a:rPr>
+              <a:t>  </a:t>
+            </a:r>
+            <a:r>
+              <a:rPr lang="en-US" dirty="0">
+                <a:latin typeface="Consolas"/>
+                <a:cs typeface="Consolas"/>
+              </a:rPr>
+              <a:t> </a:t>
+            </a:r>
+            <a:r>
+              <a:rPr lang="en-US" dirty="0" smtClean="0">
+                <a:latin typeface="Consolas"/>
+                <a:cs typeface="Consolas"/>
+              </a:rPr>
+              <a:t> </a:t>
+            </a:r>
+            <a:r>
+              <a:rPr lang="en-US" dirty="0" err="1" smtClean="0">
+                <a:latin typeface="Consolas"/>
+                <a:cs typeface="Consolas"/>
+              </a:rPr>
+              <a:t>ckout</a:t>
+            </a:r>
+            <a:r>
+              <a:rPr lang="en-US" dirty="0" smtClean="0">
+                <a:latin typeface="Consolas"/>
+                <a:cs typeface="Consolas"/>
+              </a:rPr>
+              <a:t>&lt;&lt;“Hello </a:t>
+            </a:r>
+            <a:r>
+              <a:rPr lang="en-US" dirty="0">
+                <a:latin typeface="Consolas"/>
+                <a:cs typeface="Consolas"/>
+              </a:rPr>
+              <a:t>World!</a:t>
+            </a:r>
+            <a:r>
+              <a:rPr lang="en-US" dirty="0" smtClean="0">
+                <a:latin typeface="Consolas"/>
+                <a:cs typeface="Consolas"/>
+              </a:rPr>
+              <a:t>”&lt;&lt;</a:t>
+            </a:r>
+            <a:r>
+              <a:rPr lang="en-US" dirty="0" err="1" smtClean="0">
                 <a:latin typeface="Consolas"/>
                 <a:cs typeface="Consolas"/>
               </a:rPr>
@@ -10460,7 +10514,7 @@
                 <a:latin typeface="Consolas"/>
                 <a:cs typeface="Consolas"/>
               </a:rPr>
-              <a:t>     </a:t>
+              <a:t>   </a:t>
             </a:r>
             <a:r>
               <a:rPr lang="en-US" dirty="0" err="1" smtClean="0">
@@ -10482,11 +10536,25 @@
               <a:buNone/>
             </a:pPr>
             <a:r>
+              <a:rPr lang="en-US" dirty="0">
+                <a:latin typeface="Consolas"/>
+                <a:cs typeface="Consolas"/>
+              </a:rPr>
+              <a:t> </a:t>
+            </a:r>
+            <a:r>
               <a:rPr lang="en-US" dirty="0" smtClean="0">
                 <a:latin typeface="Consolas"/>
                 <a:cs typeface="Consolas"/>
               </a:rPr>
-              <a:t>   }</a:t>
+              <a:t> </a:t>
+            </a:r>
+            <a:r>
+              <a:rPr lang="en-US" dirty="0" smtClean="0">
+                <a:latin typeface="Consolas"/>
+                <a:cs typeface="Consolas"/>
+              </a:rPr>
+              <a:t>}</a:t>
             </a:r>
             <a:r>
               <a:rPr lang="en-US" dirty="0">

</xml_diff>

<commit_message>
Fix quotes in text and fix picture
</commit_message>
<xml_diff>
--- a/tutorial-02-hello_world.pptx
+++ b/tutorial-02-hello_world.pptx
@@ -8963,7 +8963,7 @@
                 <a:latin typeface="Consolas"/>
                 <a:cs typeface="Consolas"/>
               </a:rPr>
-              <a:t>   </a:t>
+              <a:t>  </a:t>
             </a:r>
             <a:r>
               <a:rPr lang="en-US" b="1" dirty="0" err="1" smtClean="0">
@@ -9008,7 +9008,7 @@
                 <a:latin typeface="Consolas"/>
                 <a:cs typeface="Consolas"/>
               </a:rPr>
-              <a:t>      </a:t>
+              <a:t>    </a:t>
             </a:r>
             <a:r>
               <a:rPr lang="en-US" b="1" dirty="0" smtClean="0">
@@ -9090,7 +9090,27 @@
                 <a:latin typeface="Consolas"/>
                 <a:cs typeface="Consolas"/>
               </a:rPr>
-              <a:t>  };</a:t>
+              <a:t> </a:t>
+            </a:r>
+            <a:r>
+              <a:rPr lang="en-US" dirty="0" smtClean="0">
+                <a:solidFill>
+                  <a:srgbClr val="292934"/>
+                </a:solidFill>
+                <a:latin typeface="Consolas"/>
+                <a:cs typeface="Consolas"/>
+              </a:rPr>
+              <a:t>}</a:t>
+            </a:r>
+            <a:r>
+              <a:rPr lang="en-US" dirty="0" smtClean="0">
+                <a:solidFill>
+                  <a:srgbClr val="292934"/>
+                </a:solidFill>
+                <a:latin typeface="Consolas"/>
+                <a:cs typeface="Consolas"/>
+              </a:rPr>
+              <a:t>;</a:t>
             </a:r>
           </a:p>
           <a:p>
@@ -9317,7 +9337,14 @@
                 <a:latin typeface="Consolas"/>
                 <a:cs typeface="Consolas"/>
               </a:rPr>
-              <a:t>   public</a:t>
+              <a:t>  </a:t>
+            </a:r>
+            <a:r>
+              <a:rPr lang="en-US" b="1" dirty="0" smtClean="0">
+                <a:latin typeface="Consolas"/>
+                <a:cs typeface="Consolas"/>
+              </a:rPr>
+              <a:t>public</a:t>
             </a:r>
             <a:r>
               <a:rPr lang="en-US" dirty="0">
@@ -9350,7 +9377,7 @@
                 <a:latin typeface="Consolas"/>
                 <a:cs typeface="Consolas"/>
               </a:rPr>
-              <a:t>      </a:t>
+              <a:t>    </a:t>
             </a:r>
             <a:r>
               <a:rPr lang="en-US" dirty="0" err="1" smtClean="0">
@@ -9371,7 +9398,21 @@
                 <a:latin typeface="Consolas"/>
                 <a:cs typeface="Consolas"/>
               </a:rPr>
-              <a:t>&lt;&lt; ”Hello World!” &lt;&lt; </a:t>
+              <a:t>&lt;&lt; </a:t>
+            </a:r>
+            <a:r>
+              <a:rPr lang="en-US" dirty="0" smtClean="0">
+                <a:latin typeface="Consolas"/>
+                <a:cs typeface="Consolas"/>
+              </a:rPr>
+              <a:t>“Hello </a:t>
+            </a:r>
+            <a:r>
+              <a:rPr lang="en-US" dirty="0">
+                <a:latin typeface="Consolas"/>
+                <a:cs typeface="Consolas"/>
+              </a:rPr>
+              <a:t>World!” &lt;&lt; </a:t>
             </a:r>
             <a:r>
               <a:rPr lang="en-US" dirty="0" err="1">
@@ -9401,7 +9442,7 @@
                 <a:latin typeface="Consolas"/>
                 <a:cs typeface="Consolas"/>
               </a:rPr>
-              <a:t>      </a:t>
+              <a:t>    </a:t>
             </a:r>
             <a:r>
               <a:rPr lang="en-US" dirty="0" err="1" smtClean="0">
@@ -9427,7 +9468,14 @@
                 <a:latin typeface="Consolas"/>
                 <a:cs typeface="Consolas"/>
               </a:rPr>
-              <a:t>   }</a:t>
+              <a:t>  </a:t>
+            </a:r>
+            <a:r>
+              <a:rPr lang="en-US" dirty="0" smtClean="0">
+                <a:latin typeface="Consolas"/>
+                <a:cs typeface="Consolas"/>
+              </a:rPr>
+              <a:t>}</a:t>
             </a:r>
             <a:r>
               <a:rPr lang="en-US" dirty="0">
@@ -9474,14 +9522,14 @@
               <a:t>#include </a:t>
             </a:r>
             <a:r>
-              <a:rPr lang="en-US" dirty="0">
-                <a:latin typeface="Consolas"/>
-                <a:cs typeface="Consolas"/>
-              </a:rPr>
-              <a:t>”</a:t>
-            </a:r>
-            <a:r>
-              <a:rPr lang="en-US" dirty="0" err="1">
+              <a:rPr lang="en-US" dirty="0" smtClean="0">
+                <a:latin typeface="Consolas"/>
+                <a:cs typeface="Consolas"/>
+              </a:rPr>
+              <a:t>“</a:t>
+            </a:r>
+            <a:r>
+              <a:rPr lang="en-US" dirty="0" err="1" smtClean="0">
                 <a:latin typeface="Consolas"/>
                 <a:cs typeface="Consolas"/>
               </a:rPr>
@@ -9872,14 +9920,7 @@
                 <a:latin typeface="Consolas"/>
                 <a:cs typeface="Consolas"/>
               </a:rPr>
-              <a:t> </a:t>
-            </a:r>
-            <a:r>
-              <a:rPr lang="en-US" sz="1900" dirty="0" smtClean="0">
-                <a:latin typeface="Consolas"/>
-                <a:cs typeface="Consolas"/>
-              </a:rPr>
-              <a:t>}</a:t>
+              <a:t> }</a:t>
             </a:r>
             <a:r>
               <a:rPr lang="en-US" sz="1900" dirty="0">
@@ -9975,21 +10016,7 @@
                 <a:latin typeface="Consolas"/>
                 <a:cs typeface="Consolas"/>
               </a:rPr>
-              <a:t>  </a:t>
-            </a:r>
-            <a:r>
-              <a:rPr lang="en-US" sz="1900" dirty="0" smtClean="0">
-                <a:latin typeface="Consolas"/>
-                <a:cs typeface="Consolas"/>
-              </a:rPr>
-              <a:t>}</a:t>
-            </a:r>
-            <a:r>
-              <a:rPr lang="en-US" sz="1900" dirty="0" smtClean="0">
-                <a:latin typeface="Consolas"/>
-                <a:cs typeface="Consolas"/>
-              </a:rPr>
-              <a:t>;</a:t>
+              <a:t>  };</a:t>
             </a:r>
           </a:p>
           <a:p>
@@ -10293,14 +10320,7 @@
                 <a:latin typeface="Consolas"/>
                 <a:cs typeface="Consolas"/>
               </a:rPr>
-              <a:t> </a:t>
-            </a:r>
-            <a:r>
-              <a:rPr lang="en-US" dirty="0" smtClean="0">
-                <a:latin typeface="Consolas"/>
-                <a:cs typeface="Consolas"/>
-              </a:rPr>
-              <a:t>}</a:t>
+              <a:t> }</a:t>
             </a:r>
             <a:r>
               <a:rPr lang="en-US" dirty="0">
@@ -10547,14 +10567,7 @@
                 <a:latin typeface="Consolas"/>
                 <a:cs typeface="Consolas"/>
               </a:rPr>
-              <a:t> </a:t>
-            </a:r>
-            <a:r>
-              <a:rPr lang="en-US" dirty="0" smtClean="0">
-                <a:latin typeface="Consolas"/>
-                <a:cs typeface="Consolas"/>
-              </a:rPr>
-              <a:t>}</a:t>
+              <a:t> }</a:t>
             </a:r>
             <a:r>
               <a:rPr lang="en-US" dirty="0">
@@ -10701,7 +10714,7 @@
               </a:ext>
             </a:extLst>
           </a:blip>
-          <a:srcRect l="29547" r="29547"/>
+          <a:srcRect t="-72227" b="-72227"/>
           <a:stretch>
             <a:fillRect/>
           </a:stretch>

</xml_diff>